<commit_message>
1. Added design slide. 2. Added perftrack slides. 3. Modified formatting
</commit_message>
<xml_diff>
--- a/paper/Integrated Data Center Power and Cooling Analysis.pptx
+++ b/paper/Integrated Data Center Power and Cooling Analysis.pptx
@@ -8,14 +8,15 @@
     <p:sldId id="256" r:id="rId2"/>
     <p:sldId id="265" r:id="rId3"/>
     <p:sldId id="266" r:id="rId4"/>
-    <p:sldId id="258" r:id="rId5"/>
-    <p:sldId id="259" r:id="rId6"/>
-    <p:sldId id="260" r:id="rId7"/>
-    <p:sldId id="261" r:id="rId8"/>
-    <p:sldId id="267" r:id="rId9"/>
-    <p:sldId id="262" r:id="rId10"/>
-    <p:sldId id="263" r:id="rId11"/>
-    <p:sldId id="264" r:id="rId12"/>
+    <p:sldId id="268" r:id="rId5"/>
+    <p:sldId id="258" r:id="rId6"/>
+    <p:sldId id="259" r:id="rId7"/>
+    <p:sldId id="260" r:id="rId8"/>
+    <p:sldId id="261" r:id="rId9"/>
+    <p:sldId id="267" r:id="rId10"/>
+    <p:sldId id="262" r:id="rId11"/>
+    <p:sldId id="263" r:id="rId12"/>
+    <p:sldId id="264" r:id="rId13"/>
   </p:sldIdLst>
   <p:sldSz cx="9144000" cy="6858000" type="screen4x3"/>
   <p:notesSz cx="6858000" cy="9144000"/>
@@ -3327,12 +3328,12 @@
           <a:lstStyle/>
           <a:p>
             <a:r>
+              <a:rPr lang="en-US" sz="4000" dirty="0" err="1" smtClean="0"/>
+              <a:t>Perftrack</a:t>
+            </a:r>
+            <a:r>
               <a:rPr lang="en-US" sz="4000" dirty="0" smtClean="0"/>
-              <a:t>Perftrack Modifications </a:t>
-            </a:r>
-            <a:r>
-              <a:rPr lang="en-US" sz="4000" dirty="0" smtClean="0"/>
-              <a:t>(cont.)</a:t>
+              <a:t>: Data Analysis Tool</a:t>
             </a:r>
             <a:endParaRPr lang="en-US" sz="4000" dirty="0"/>
           </a:p>
@@ -3346,6 +3347,126 @@
           </p:cNvSpPr>
           <p:nvPr>
             <p:ph idx="1"/>
+          </p:nvPr>
+        </p:nvSpPr>
+        <p:spPr>
+          <a:xfrm>
+            <a:off x="457200" y="1600200"/>
+            <a:ext cx="7620000" cy="4800600"/>
+          </a:xfrm>
+        </p:spPr>
+        <p:txBody>
+          <a:bodyPr>
+            <a:normAutofit/>
+          </a:bodyPr>
+          <a:lstStyle/>
+          <a:p>
+            <a:r>
+              <a:rPr lang="en-US" sz="2400" dirty="0" smtClean="0"/>
+              <a:t>Data </a:t>
+            </a:r>
+            <a:r>
+              <a:rPr lang="en-US" sz="2400" dirty="0"/>
+              <a:t>store and interface for managing performance data</a:t>
+            </a:r>
+          </a:p>
+          <a:p>
+            <a:endParaRPr lang="en-US" sz="2400" dirty="0" smtClean="0"/>
+          </a:p>
+          <a:p>
+            <a:r>
+              <a:rPr lang="en-US" sz="2400" dirty="0" smtClean="0"/>
+              <a:t>Compares </a:t>
+            </a:r>
+            <a:r>
+              <a:rPr lang="en-US" sz="2400" dirty="0"/>
+              <a:t>the data collected in different locations and formats in single performance analysis session</a:t>
+            </a:r>
+          </a:p>
+          <a:p>
+            <a:endParaRPr lang="en-US" sz="2400" dirty="0" smtClean="0"/>
+          </a:p>
+          <a:p>
+            <a:r>
+              <a:rPr lang="en-US" sz="2400" dirty="0" smtClean="0"/>
+              <a:t>Includes </a:t>
+            </a:r>
+            <a:r>
+              <a:rPr lang="en-US" sz="2400" dirty="0"/>
+              <a:t>interfaces to data store and scripts for automatically collecting data describing each experiment</a:t>
+            </a:r>
+          </a:p>
+          <a:p>
+            <a:endParaRPr lang="en-US" sz="2400" dirty="0" smtClean="0"/>
+          </a:p>
+          <a:p>
+            <a:r>
+              <a:rPr lang="en-US" sz="2400" dirty="0" smtClean="0"/>
+              <a:t>Includes </a:t>
+            </a:r>
+            <a:r>
+              <a:rPr lang="en-US" sz="2400" dirty="0"/>
+              <a:t>a graphical user interface</a:t>
+            </a:r>
+          </a:p>
+          <a:p>
+            <a:endParaRPr lang="en-US" sz="2400" dirty="0" smtClean="0"/>
+          </a:p>
+          <a:p>
+            <a:r>
+              <a:rPr lang="en-US" sz="2400" dirty="0" smtClean="0"/>
+              <a:t>Written </a:t>
+            </a:r>
+            <a:r>
+              <a:rPr lang="en-US" sz="2400" dirty="0"/>
+              <a:t>in C++, QT and </a:t>
+            </a:r>
+            <a:r>
+              <a:rPr lang="en-US" sz="2400" dirty="0" smtClean="0"/>
+              <a:t>Python</a:t>
+            </a:r>
+            <a:endParaRPr lang="en-US" sz="2400" dirty="0"/>
+          </a:p>
+        </p:txBody>
+      </p:sp>
+    </p:spTree>
+    <p:extLst>
+      <p:ext uri="{BB962C8B-B14F-4D97-AF65-F5344CB8AC3E}">
+        <p14:creationId xmlns:p14="http://schemas.microsoft.com/office/powerpoint/2010/main" val="3126784475"/>
+      </p:ext>
+    </p:extLst>
+  </p:cSld>
+  <p:clrMapOvr>
+    <a:masterClrMapping/>
+  </p:clrMapOvr>
+</p:sld>
+</file>
+
+<file path=ppt/slides/slide11.xml><?xml version="1.0" encoding="utf-8"?>
+<p:sld xmlns:a="http://schemas.openxmlformats.org/drawingml/2006/main" xmlns:r="http://schemas.openxmlformats.org/officeDocument/2006/relationships" xmlns:p="http://schemas.openxmlformats.org/presentationml/2006/main">
+  <p:cSld>
+    <p:spTree>
+      <p:nvGrpSpPr>
+        <p:cNvPr id="1" name=""/>
+        <p:cNvGrpSpPr/>
+        <p:nvPr/>
+      </p:nvGrpSpPr>
+      <p:grpSpPr>
+        <a:xfrm>
+          <a:off x="0" y="0"/>
+          <a:ext cx="0" cy="0"/>
+          <a:chOff x="0" y="0"/>
+          <a:chExt cx="0" cy="0"/>
+        </a:xfrm>
+      </p:grpSpPr>
+      <p:sp>
+        <p:nvSpPr>
+          <p:cNvPr id="2" name="Title 1"/>
+          <p:cNvSpPr>
+            <a:spLocks noGrp="1"/>
+          </p:cNvSpPr>
+          <p:nvPr>
+            <p:ph type="title"/>
           </p:nvPr>
         </p:nvSpPr>
         <p:spPr/>
@@ -3353,7 +3474,115 @@
           <a:bodyPr/>
           <a:lstStyle/>
           <a:p>
-            <a:endParaRPr lang="en-US"/>
+            <a:r>
+              <a:rPr lang="en-US" sz="4000" dirty="0" smtClean="0"/>
+              <a:t>Approach 2: </a:t>
+            </a:r>
+            <a:r>
+              <a:rPr lang="en-US" sz="4000" dirty="0" err="1" smtClean="0"/>
+              <a:t>Perftrack</a:t>
+            </a:r>
+            <a:r>
+              <a:rPr lang="en-US" sz="4000" dirty="0" smtClean="0"/>
+              <a:t> Modifications</a:t>
+            </a:r>
+            <a:endParaRPr lang="en-US" sz="4000" dirty="0"/>
+          </a:p>
+        </p:txBody>
+      </p:sp>
+      <p:sp>
+        <p:nvSpPr>
+          <p:cNvPr id="3" name="Content Placeholder 2"/>
+          <p:cNvSpPr>
+            <a:spLocks noGrp="1"/>
+          </p:cNvSpPr>
+          <p:nvPr>
+            <p:ph idx="1"/>
+          </p:nvPr>
+        </p:nvSpPr>
+        <p:spPr/>
+        <p:txBody>
+          <a:bodyPr/>
+          <a:lstStyle/>
+          <a:p>
+            <a:r>
+              <a:rPr lang="en-US" sz="2400" dirty="0"/>
+              <a:t>ELKI: Open source, Java-based clustering </a:t>
+            </a:r>
+            <a:r>
+              <a:rPr lang="en-US" sz="2400" dirty="0" smtClean="0"/>
+              <a:t>package</a:t>
+            </a:r>
+          </a:p>
+          <a:p>
+            <a:endParaRPr lang="en-US" sz="2400" dirty="0"/>
+          </a:p>
+          <a:p>
+            <a:r>
+              <a:rPr lang="en-US" sz="2400" dirty="0"/>
+              <a:t>New menu item ‘Cluster Data’ is added to </a:t>
+            </a:r>
+            <a:r>
+              <a:rPr lang="en-US" sz="2400" dirty="0" err="1"/>
+              <a:t>Perftrack</a:t>
+            </a:r>
+            <a:endParaRPr lang="en-US" sz="2400" dirty="0"/>
+          </a:p>
+          <a:p>
+            <a:endParaRPr lang="en-US" sz="2400" dirty="0" smtClean="0"/>
+          </a:p>
+          <a:p>
+            <a:r>
+              <a:rPr lang="en-US" sz="2400" dirty="0" err="1" smtClean="0"/>
+              <a:t>Perftrack</a:t>
+            </a:r>
+            <a:r>
+              <a:rPr lang="en-US" sz="2400" dirty="0" smtClean="0"/>
+              <a:t> </a:t>
+            </a:r>
+            <a:r>
+              <a:rPr lang="en-US" sz="2400" dirty="0"/>
+              <a:t>is modified to generate the ELKI-compatible raw data from user filtered experiment data using GUI</a:t>
+            </a:r>
+          </a:p>
+          <a:p>
+            <a:endParaRPr lang="en-US" sz="2400" dirty="0" smtClean="0"/>
+          </a:p>
+          <a:p>
+            <a:r>
+              <a:rPr lang="en-US" sz="2400" dirty="0" smtClean="0"/>
+              <a:t>K-Means </a:t>
+            </a:r>
+            <a:r>
+              <a:rPr lang="en-US" sz="2400" dirty="0"/>
+              <a:t>clustering algorithm is executed on </a:t>
+            </a:r>
+            <a:r>
+              <a:rPr lang="en-US" sz="2400" dirty="0" smtClean="0"/>
+              <a:t>ELKI-compatible </a:t>
+            </a:r>
+            <a:r>
+              <a:rPr lang="en-US" sz="2400" dirty="0"/>
+              <a:t>raw data using ELKI package</a:t>
+            </a:r>
+          </a:p>
+          <a:p>
+            <a:endParaRPr lang="en-US" sz="2400" dirty="0" smtClean="0"/>
+          </a:p>
+          <a:p>
+            <a:r>
+              <a:rPr lang="en-US" sz="2400" dirty="0" err="1" smtClean="0"/>
+              <a:t>Perftrack</a:t>
+            </a:r>
+            <a:r>
+              <a:rPr lang="en-US" sz="2400" dirty="0" smtClean="0"/>
+              <a:t> </a:t>
+            </a:r>
+            <a:r>
+              <a:rPr lang="en-US" sz="2400" dirty="0"/>
+              <a:t>displays the clusters</a:t>
+            </a:r>
+            <a:endParaRPr lang="en-US" dirty="0"/>
           </a:p>
         </p:txBody>
       </p:sp>
@@ -3377,7 +3606,7 @@
 </p:sld>
 </file>
 
-<file path=ppt/slides/slide11.xml><?xml version="1.0" encoding="utf-8"?>
+<file path=ppt/slides/slide12.xml><?xml version="1.0" encoding="utf-8"?>
 <p:sld xmlns:a="http://schemas.openxmlformats.org/drawingml/2006/main" xmlns:r="http://schemas.openxmlformats.org/officeDocument/2006/relationships" xmlns:p="http://schemas.openxmlformats.org/presentationml/2006/main">
   <p:cSld>
     <p:spTree>
@@ -3411,7 +3640,7 @@
           <a:p>
             <a:r>
               <a:rPr lang="en-US" dirty="0" smtClean="0"/>
-              <a:t>Limitations / Future work</a:t>
+              <a:t>Future Work</a:t>
             </a:r>
             <a:endParaRPr lang="en-US" dirty="0"/>
           </a:p>
@@ -3429,7 +3658,9 @@
         </p:nvSpPr>
         <p:spPr/>
         <p:txBody>
-          <a:bodyPr/>
+          <a:bodyPr>
+            <a:normAutofit lnSpcReduction="10000"/>
+          </a:bodyPr>
           <a:lstStyle/>
           <a:p>
             <a:r>
@@ -3445,9 +3676,66 @@
           </a:p>
           <a:p>
             <a:r>
+              <a:rPr lang="en-US" dirty="0" err="1" smtClean="0"/>
+              <a:t>Perftrack</a:t>
+            </a:r>
+            <a:r>
               <a:rPr lang="en-US" dirty="0" smtClean="0"/>
-              <a:t>Full integration of script work into Perftrack</a:t>
-            </a:r>
+              <a:t>:</a:t>
+            </a:r>
+          </a:p>
+          <a:p>
+            <a:pPr lvl="1"/>
+            <a:r>
+              <a:rPr lang="en-US" dirty="0" smtClean="0"/>
+              <a:t>Full </a:t>
+            </a:r>
+            <a:r>
+              <a:rPr lang="en-US" dirty="0" smtClean="0"/>
+              <a:t>integration of script </a:t>
+            </a:r>
+            <a:r>
+              <a:rPr lang="en-US" dirty="0" smtClean="0"/>
+              <a:t>work</a:t>
+            </a:r>
+          </a:p>
+          <a:p>
+            <a:pPr lvl="1"/>
+            <a:r>
+              <a:rPr lang="en-US" dirty="0"/>
+              <a:t>On-the-fly data generation for </a:t>
+            </a:r>
+            <a:r>
+              <a:rPr lang="en-US" dirty="0" smtClean="0"/>
+              <a:t>ELKI</a:t>
+            </a:r>
+          </a:p>
+          <a:p>
+            <a:pPr lvl="1"/>
+            <a:r>
+              <a:rPr lang="en-US" dirty="0" smtClean="0"/>
+              <a:t>Tightly-coupled </a:t>
+            </a:r>
+            <a:r>
+              <a:rPr lang="en-US" dirty="0"/>
+              <a:t>integration of </a:t>
+            </a:r>
+            <a:r>
+              <a:rPr lang="en-US" dirty="0" smtClean="0"/>
+              <a:t>ELKI</a:t>
+            </a:r>
+          </a:p>
+          <a:p>
+            <a:pPr lvl="1"/>
+            <a:r>
+              <a:rPr lang="en-US" dirty="0" smtClean="0"/>
+              <a:t>Graphica</a:t>
+            </a:r>
+            <a:r>
+              <a:rPr lang="en-US" dirty="0" smtClean="0"/>
+              <a:t>l user interface enhancement</a:t>
+            </a:r>
+            <a:endParaRPr lang="en-US" dirty="0" smtClean="0"/>
           </a:p>
           <a:p>
             <a:endParaRPr lang="en-US" dirty="0" smtClean="0"/>
@@ -3516,7 +3804,11 @@
           <a:p>
             <a:r>
               <a:rPr lang="en-US" dirty="0" smtClean="0"/>
-              <a:t>About the project</a:t>
+              <a:t>About the </a:t>
+            </a:r>
+            <a:r>
+              <a:rPr lang="en-US" dirty="0" smtClean="0"/>
+              <a:t>Project</a:t>
             </a:r>
             <a:endParaRPr lang="en-US" dirty="0"/>
           </a:p>
@@ -3630,7 +3922,11 @@
           <a:p>
             <a:r>
               <a:rPr lang="en-US" dirty="0" smtClean="0"/>
-              <a:t>About the data</a:t>
+              <a:t>About the </a:t>
+            </a:r>
+            <a:r>
+              <a:rPr lang="en-US" dirty="0" smtClean="0"/>
+              <a:t>Data</a:t>
             </a:r>
             <a:endParaRPr lang="en-US" dirty="0"/>
           </a:p>
@@ -3729,6 +4025,52 @@
       </p:grpSpPr>
       <p:sp>
         <p:nvSpPr>
+          <p:cNvPr id="89" name="Rounded Rectangle 88"/>
+          <p:cNvSpPr/>
+          <p:nvPr/>
+        </p:nvSpPr>
+        <p:spPr>
+          <a:xfrm>
+            <a:off x="544727" y="1371600"/>
+            <a:ext cx="3733800" cy="5410202"/>
+          </a:xfrm>
+          <a:prstGeom prst="roundRect">
+            <a:avLst/>
+          </a:prstGeom>
+          <a:solidFill>
+            <a:schemeClr val="accent5">
+              <a:lumMod val="20000"/>
+              <a:lumOff val="80000"/>
+            </a:schemeClr>
+          </a:solidFill>
+        </p:spPr>
+        <p:style>
+          <a:lnRef idx="2">
+            <a:schemeClr val="accent1">
+              <a:shade val="50000"/>
+            </a:schemeClr>
+          </a:lnRef>
+          <a:fillRef idx="1">
+            <a:schemeClr val="accent1"/>
+          </a:fillRef>
+          <a:effectRef idx="0">
+            <a:schemeClr val="accent1"/>
+          </a:effectRef>
+          <a:fontRef idx="minor">
+            <a:schemeClr val="lt1"/>
+          </a:fontRef>
+        </p:style>
+        <p:txBody>
+          <a:bodyPr rtlCol="0" anchor="ctr"/>
+          <a:lstStyle/>
+          <a:p>
+            <a:pPr algn="ctr"/>
+            <a:endParaRPr lang="en-US"/>
+          </a:p>
+        </p:txBody>
+      </p:sp>
+      <p:sp>
+        <p:nvSpPr>
           <p:cNvPr id="2" name="Title 1"/>
           <p:cNvSpPr>
             <a:spLocks noGrp="1"/>
@@ -3737,100 +4079,2259 @@
             <p:ph type="title"/>
           </p:nvPr>
         </p:nvSpPr>
-        <p:spPr/>
-        <p:txBody>
-          <a:bodyPr>
-            <a:normAutofit fontScale="90000"/>
-          </a:bodyPr>
+        <p:spPr>
+          <a:xfrm>
+            <a:off x="457200" y="254435"/>
+            <a:ext cx="7620000" cy="899450"/>
+          </a:xfrm>
+        </p:spPr>
+        <p:txBody>
+          <a:bodyPr/>
           <a:lstStyle/>
           <a:p>
             <a:r>
               <a:rPr lang="en-US" dirty="0" smtClean="0"/>
-              <a:t>Approach 1: Analysis with Scripts</a:t>
+              <a:t>Project Design</a:t>
             </a:r>
             <a:endParaRPr lang="en-US" dirty="0"/>
           </a:p>
         </p:txBody>
       </p:sp>
-      <p:sp>
-        <p:nvSpPr>
-          <p:cNvPr id="3" name="Content Placeholder 2"/>
-          <p:cNvSpPr>
-            <a:spLocks noGrp="1"/>
-          </p:cNvSpPr>
-          <p:nvPr>
-            <p:ph idx="1"/>
-          </p:nvPr>
-        </p:nvSpPr>
-        <p:spPr/>
-        <p:txBody>
-          <a:bodyPr>
-            <a:normAutofit/>
-          </a:bodyPr>
+      <p:grpSp>
+        <p:nvGrpSpPr>
+          <p:cNvPr id="1042" name="Group 1041"/>
+          <p:cNvGrpSpPr/>
+          <p:nvPr/>
+        </p:nvGrpSpPr>
+        <p:grpSpPr>
+          <a:xfrm>
+            <a:off x="914400" y="1828800"/>
+            <a:ext cx="3059328" cy="4343882"/>
+            <a:chOff x="914400" y="1676400"/>
+            <a:chExt cx="3059328" cy="4343882"/>
+          </a:xfrm>
+        </p:grpSpPr>
+        <p:grpSp>
+          <p:nvGrpSpPr>
+            <p:cNvPr id="1032" name="Group 1031"/>
+            <p:cNvGrpSpPr/>
+            <p:nvPr/>
+          </p:nvGrpSpPr>
+          <p:grpSpPr>
+            <a:xfrm>
+              <a:off x="1001928" y="1676400"/>
+              <a:ext cx="2971800" cy="1143000"/>
+              <a:chOff x="1143001" y="1219200"/>
+              <a:chExt cx="2971800" cy="1143000"/>
+            </a:xfrm>
+          </p:grpSpPr>
+          <p:sp>
+            <p:nvSpPr>
+              <p:cNvPr id="16" name="Round Same Side Corner Rectangle 15"/>
+              <p:cNvSpPr/>
+              <p:nvPr/>
+            </p:nvSpPr>
+            <p:spPr>
+              <a:xfrm>
+                <a:off x="1143001" y="1219200"/>
+                <a:ext cx="2971800" cy="1143000"/>
+              </a:xfrm>
+              <a:prstGeom prst="round2SameRect">
+                <a:avLst/>
+              </a:prstGeom>
+              <a:solidFill>
+                <a:schemeClr val="accent2">
+                  <a:lumMod val="20000"/>
+                  <a:lumOff val="80000"/>
+                </a:schemeClr>
+              </a:solidFill>
+            </p:spPr>
+            <p:style>
+              <a:lnRef idx="2">
+                <a:schemeClr val="accent1">
+                  <a:shade val="50000"/>
+                </a:schemeClr>
+              </a:lnRef>
+              <a:fillRef idx="1">
+                <a:schemeClr val="accent1"/>
+              </a:fillRef>
+              <a:effectRef idx="0">
+                <a:schemeClr val="accent1"/>
+              </a:effectRef>
+              <a:fontRef idx="minor">
+                <a:schemeClr val="lt1"/>
+              </a:fontRef>
+            </p:style>
+            <p:txBody>
+              <a:bodyPr rtlCol="0" anchor="b"/>
+              <a:lstStyle/>
+              <a:p>
+                <a:pPr algn="r"/>
+                <a:r>
+                  <a:rPr lang="en-US" b="1" dirty="0" smtClean="0">
+                    <a:solidFill>
+                      <a:schemeClr val="tx1"/>
+                    </a:solidFill>
+                  </a:rPr>
+                  <a:t>Raw Data</a:t>
+                </a:r>
+                <a:endParaRPr lang="en-US" b="1" dirty="0">
+                  <a:solidFill>
+                    <a:schemeClr val="tx1"/>
+                  </a:solidFill>
+                </a:endParaRPr>
+              </a:p>
+            </p:txBody>
+          </p:sp>
+          <p:sp>
+            <p:nvSpPr>
+              <p:cNvPr id="12" name="Flowchart: Multidocument 11"/>
+              <p:cNvSpPr/>
+              <p:nvPr/>
+            </p:nvSpPr>
+            <p:spPr>
+              <a:xfrm>
+                <a:off x="1371600" y="1371600"/>
+                <a:ext cx="1066800" cy="685800"/>
+              </a:xfrm>
+              <a:prstGeom prst="flowChartMultidocument">
+                <a:avLst/>
+              </a:prstGeom>
+              <a:solidFill>
+                <a:schemeClr val="bg1">
+                  <a:lumMod val="75000"/>
+                </a:schemeClr>
+              </a:solidFill>
+            </p:spPr>
+            <p:style>
+              <a:lnRef idx="2">
+                <a:schemeClr val="accent1">
+                  <a:shade val="50000"/>
+                </a:schemeClr>
+              </a:lnRef>
+              <a:fillRef idx="1">
+                <a:schemeClr val="accent1"/>
+              </a:fillRef>
+              <a:effectRef idx="0">
+                <a:schemeClr val="accent1"/>
+              </a:effectRef>
+              <a:fontRef idx="minor">
+                <a:schemeClr val="lt1"/>
+              </a:fontRef>
+            </p:style>
+            <p:txBody>
+              <a:bodyPr rtlCol="0" anchor="ctr"/>
+              <a:lstStyle/>
+              <a:p>
+                <a:pPr algn="ctr"/>
+                <a:r>
+                  <a:rPr lang="en-US" b="1" dirty="0" smtClean="0">
+                    <a:solidFill>
+                      <a:schemeClr val="tx1"/>
+                    </a:solidFill>
+                  </a:rPr>
+                  <a:t>CSV</a:t>
+                </a:r>
+                <a:endParaRPr lang="en-US" b="1" dirty="0">
+                  <a:solidFill>
+                    <a:schemeClr val="tx1"/>
+                  </a:solidFill>
+                </a:endParaRPr>
+              </a:p>
+            </p:txBody>
+          </p:sp>
+          <p:sp>
+            <p:nvSpPr>
+              <p:cNvPr id="14" name="Flowchart: Multidocument 13"/>
+              <p:cNvSpPr/>
+              <p:nvPr/>
+            </p:nvSpPr>
+            <p:spPr>
+              <a:xfrm>
+                <a:off x="2743200" y="1371600"/>
+                <a:ext cx="1066800" cy="685800"/>
+              </a:xfrm>
+              <a:prstGeom prst="flowChartMultidocument">
+                <a:avLst/>
+              </a:prstGeom>
+              <a:solidFill>
+                <a:schemeClr val="bg1">
+                  <a:lumMod val="75000"/>
+                </a:schemeClr>
+              </a:solidFill>
+            </p:spPr>
+            <p:style>
+              <a:lnRef idx="2">
+                <a:schemeClr val="accent1">
+                  <a:shade val="50000"/>
+                </a:schemeClr>
+              </a:lnRef>
+              <a:fillRef idx="1">
+                <a:schemeClr val="accent1"/>
+              </a:fillRef>
+              <a:effectRef idx="0">
+                <a:schemeClr val="accent1"/>
+              </a:effectRef>
+              <a:fontRef idx="minor">
+                <a:schemeClr val="lt1"/>
+              </a:fontRef>
+            </p:style>
+            <p:txBody>
+              <a:bodyPr rtlCol="0" anchor="ctr"/>
+              <a:lstStyle/>
+              <a:p>
+                <a:pPr algn="ctr"/>
+                <a:r>
+                  <a:rPr lang="en-US" b="1" dirty="0" smtClean="0">
+                    <a:solidFill>
+                      <a:schemeClr val="tx1"/>
+                    </a:solidFill>
+                  </a:rPr>
+                  <a:t>CSV</a:t>
+                </a:r>
+                <a:endParaRPr lang="en-US" b="1" dirty="0">
+                  <a:solidFill>
+                    <a:schemeClr val="tx1"/>
+                  </a:solidFill>
+                </a:endParaRPr>
+              </a:p>
+            </p:txBody>
+          </p:sp>
+        </p:grpSp>
+        <p:sp>
+          <p:nvSpPr>
+            <p:cNvPr id="19" name="Down Arrow 18"/>
+            <p:cNvSpPr/>
+            <p:nvPr/>
+          </p:nvSpPr>
+          <p:spPr>
+            <a:xfrm>
+              <a:off x="1372489" y="2819400"/>
+              <a:ext cx="457200" cy="381000"/>
+            </a:xfrm>
+            <a:prstGeom prst="downArrow">
+              <a:avLst/>
+            </a:prstGeom>
+            <a:solidFill>
+              <a:schemeClr val="tx2">
+                <a:lumMod val="75000"/>
+              </a:schemeClr>
+            </a:solidFill>
+          </p:spPr>
+          <p:style>
+            <a:lnRef idx="2">
+              <a:schemeClr val="accent1">
+                <a:shade val="50000"/>
+              </a:schemeClr>
+            </a:lnRef>
+            <a:fillRef idx="1">
+              <a:schemeClr val="accent1"/>
+            </a:fillRef>
+            <a:effectRef idx="0">
+              <a:schemeClr val="accent1"/>
+            </a:effectRef>
+            <a:fontRef idx="minor">
+              <a:schemeClr val="lt1"/>
+            </a:fontRef>
+          </p:style>
+          <p:txBody>
+            <a:bodyPr rtlCol="0" anchor="ctr"/>
+            <a:lstStyle/>
+            <a:p>
+              <a:pPr algn="ctr"/>
+              <a:endParaRPr lang="en-US"/>
+            </a:p>
+          </p:txBody>
+        </p:sp>
+        <p:sp>
+          <p:nvSpPr>
+            <p:cNvPr id="58" name="Down Arrow 57"/>
+            <p:cNvSpPr/>
+            <p:nvPr/>
+          </p:nvSpPr>
+          <p:spPr>
+            <a:xfrm>
+              <a:off x="2983127" y="2819400"/>
+              <a:ext cx="457200" cy="381000"/>
+            </a:xfrm>
+            <a:prstGeom prst="downArrow">
+              <a:avLst/>
+            </a:prstGeom>
+            <a:solidFill>
+              <a:schemeClr val="tx2">
+                <a:lumMod val="75000"/>
+              </a:schemeClr>
+            </a:solidFill>
+          </p:spPr>
+          <p:style>
+            <a:lnRef idx="2">
+              <a:schemeClr val="accent1">
+                <a:shade val="50000"/>
+              </a:schemeClr>
+            </a:lnRef>
+            <a:fillRef idx="1">
+              <a:schemeClr val="accent1"/>
+            </a:fillRef>
+            <a:effectRef idx="0">
+              <a:schemeClr val="accent1"/>
+            </a:effectRef>
+            <a:fontRef idx="minor">
+              <a:schemeClr val="lt1"/>
+            </a:fontRef>
+          </p:style>
+          <p:txBody>
+            <a:bodyPr rtlCol="0" anchor="ctr"/>
+            <a:lstStyle/>
+            <a:p>
+              <a:pPr algn="ctr"/>
+              <a:endParaRPr lang="en-US"/>
+            </a:p>
+          </p:txBody>
+        </p:sp>
+        <p:sp>
+          <p:nvSpPr>
+            <p:cNvPr id="62" name="Rounded Rectangle 61"/>
+            <p:cNvSpPr/>
+            <p:nvPr/>
+          </p:nvSpPr>
+          <p:spPr>
+            <a:xfrm>
+              <a:off x="914400" y="3905949"/>
+              <a:ext cx="1328799" cy="585068"/>
+            </a:xfrm>
+            <a:prstGeom prst="roundRect">
+              <a:avLst/>
+            </a:prstGeom>
+          </p:spPr>
+          <p:style>
+            <a:lnRef idx="2">
+              <a:schemeClr val="accent1">
+                <a:shade val="50000"/>
+              </a:schemeClr>
+            </a:lnRef>
+            <a:fillRef idx="1">
+              <a:schemeClr val="accent1"/>
+            </a:fillRef>
+            <a:effectRef idx="0">
+              <a:schemeClr val="accent1"/>
+            </a:effectRef>
+            <a:fontRef idx="minor">
+              <a:schemeClr val="lt1"/>
+            </a:fontRef>
+          </p:style>
+          <p:txBody>
+            <a:bodyPr rtlCol="0" anchor="ctr"/>
+            <a:lstStyle/>
+            <a:p>
+              <a:pPr algn="ctr"/>
+              <a:r>
+                <a:rPr lang="en-US" b="1" dirty="0" smtClean="0">
+                  <a:solidFill>
+                    <a:schemeClr val="tx1"/>
+                  </a:solidFill>
+                </a:rPr>
+                <a:t>Plot Graphs</a:t>
+              </a:r>
+              <a:endParaRPr lang="en-US" b="1" dirty="0">
+                <a:solidFill>
+                  <a:schemeClr val="tx1"/>
+                </a:solidFill>
+              </a:endParaRPr>
+            </a:p>
+          </p:txBody>
+        </p:sp>
+        <p:sp>
+          <p:nvSpPr>
+            <p:cNvPr id="63" name="Rounded Rectangle 62"/>
+            <p:cNvSpPr/>
+            <p:nvPr/>
+          </p:nvSpPr>
+          <p:spPr>
+            <a:xfrm>
+              <a:off x="2602127" y="3910648"/>
+              <a:ext cx="1305840" cy="585068"/>
+            </a:xfrm>
+            <a:prstGeom prst="roundRect">
+              <a:avLst/>
+            </a:prstGeom>
+          </p:spPr>
+          <p:style>
+            <a:lnRef idx="2">
+              <a:schemeClr val="accent1">
+                <a:shade val="50000"/>
+              </a:schemeClr>
+            </a:lnRef>
+            <a:fillRef idx="1">
+              <a:schemeClr val="accent1"/>
+            </a:fillRef>
+            <a:effectRef idx="0">
+              <a:schemeClr val="accent1"/>
+            </a:effectRef>
+            <a:fontRef idx="minor">
+              <a:schemeClr val="lt1"/>
+            </a:fontRef>
+          </p:style>
+          <p:txBody>
+            <a:bodyPr rtlCol="0" anchor="ctr"/>
+            <a:lstStyle/>
+            <a:p>
+              <a:pPr algn="ctr"/>
+              <a:r>
+                <a:rPr lang="en-US" b="1" dirty="0" smtClean="0">
+                  <a:solidFill>
+                    <a:schemeClr val="tx1"/>
+                  </a:solidFill>
+                </a:rPr>
+                <a:t>Cluster Data</a:t>
+              </a:r>
+              <a:endParaRPr lang="en-US" b="1" dirty="0">
+                <a:solidFill>
+                  <a:schemeClr val="tx1"/>
+                </a:solidFill>
+              </a:endParaRPr>
+            </a:p>
+          </p:txBody>
+        </p:sp>
+        <p:sp>
+          <p:nvSpPr>
+            <p:cNvPr id="65" name="Rounded Rectangle 64"/>
+            <p:cNvSpPr/>
+            <p:nvPr/>
+          </p:nvSpPr>
+          <p:spPr>
+            <a:xfrm>
+              <a:off x="1001928" y="3200400"/>
+              <a:ext cx="2971800" cy="342900"/>
+            </a:xfrm>
+            <a:prstGeom prst="roundRect">
+              <a:avLst/>
+            </a:prstGeom>
+          </p:spPr>
+          <p:style>
+            <a:lnRef idx="2">
+              <a:schemeClr val="accent1">
+                <a:shade val="50000"/>
+              </a:schemeClr>
+            </a:lnRef>
+            <a:fillRef idx="1">
+              <a:schemeClr val="accent1"/>
+            </a:fillRef>
+            <a:effectRef idx="0">
+              <a:schemeClr val="accent1"/>
+            </a:effectRef>
+            <a:fontRef idx="minor">
+              <a:schemeClr val="lt1"/>
+            </a:fontRef>
+          </p:style>
+          <p:txBody>
+            <a:bodyPr rtlCol="0" anchor="ctr"/>
+            <a:lstStyle/>
+            <a:p>
+              <a:pPr algn="ctr"/>
+              <a:r>
+                <a:rPr lang="en-US" b="1" dirty="0" smtClean="0">
+                  <a:solidFill>
+                    <a:schemeClr val="tx1"/>
+                  </a:solidFill>
+                </a:rPr>
+                <a:t>Process Raw Data</a:t>
+              </a:r>
+              <a:endParaRPr lang="en-US" b="1" dirty="0">
+                <a:solidFill>
+                  <a:schemeClr val="tx1"/>
+                </a:solidFill>
+              </a:endParaRPr>
+            </a:p>
+          </p:txBody>
+        </p:sp>
+        <p:sp>
+          <p:nvSpPr>
+            <p:cNvPr id="66" name="Down Arrow 65"/>
+            <p:cNvSpPr/>
+            <p:nvPr/>
+          </p:nvSpPr>
+          <p:spPr>
+            <a:xfrm>
+              <a:off x="1350200" y="3552106"/>
+              <a:ext cx="457200" cy="296450"/>
+            </a:xfrm>
+            <a:prstGeom prst="downArrow">
+              <a:avLst/>
+            </a:prstGeom>
+            <a:solidFill>
+              <a:schemeClr val="tx2">
+                <a:lumMod val="75000"/>
+              </a:schemeClr>
+            </a:solidFill>
+          </p:spPr>
+          <p:style>
+            <a:lnRef idx="2">
+              <a:schemeClr val="accent1">
+                <a:shade val="50000"/>
+              </a:schemeClr>
+            </a:lnRef>
+            <a:fillRef idx="1">
+              <a:schemeClr val="accent1"/>
+            </a:fillRef>
+            <a:effectRef idx="0">
+              <a:schemeClr val="accent1"/>
+            </a:effectRef>
+            <a:fontRef idx="minor">
+              <a:schemeClr val="lt1"/>
+            </a:fontRef>
+          </p:style>
+          <p:txBody>
+            <a:bodyPr rtlCol="0" anchor="ctr"/>
+            <a:lstStyle/>
+            <a:p>
+              <a:pPr algn="ctr"/>
+              <a:endParaRPr lang="en-US"/>
+            </a:p>
+          </p:txBody>
+        </p:sp>
+        <p:sp>
+          <p:nvSpPr>
+            <p:cNvPr id="67" name="Down Arrow 66"/>
+            <p:cNvSpPr/>
+            <p:nvPr/>
+          </p:nvSpPr>
+          <p:spPr>
+            <a:xfrm>
+              <a:off x="2983127" y="3556348"/>
+              <a:ext cx="457200" cy="304800"/>
+            </a:xfrm>
+            <a:prstGeom prst="downArrow">
+              <a:avLst/>
+            </a:prstGeom>
+            <a:solidFill>
+              <a:schemeClr val="tx2">
+                <a:lumMod val="75000"/>
+              </a:schemeClr>
+            </a:solidFill>
+          </p:spPr>
+          <p:style>
+            <a:lnRef idx="2">
+              <a:schemeClr val="accent1">
+                <a:shade val="50000"/>
+              </a:schemeClr>
+            </a:lnRef>
+            <a:fillRef idx="1">
+              <a:schemeClr val="accent1"/>
+            </a:fillRef>
+            <a:effectRef idx="0">
+              <a:schemeClr val="accent1"/>
+            </a:effectRef>
+            <a:fontRef idx="minor">
+              <a:schemeClr val="lt1"/>
+            </a:fontRef>
+          </p:style>
+          <p:txBody>
+            <a:bodyPr rtlCol="0" anchor="ctr"/>
+            <a:lstStyle/>
+            <a:p>
+              <a:pPr algn="ctr"/>
+              <a:endParaRPr lang="en-US"/>
+            </a:p>
+          </p:txBody>
+        </p:sp>
+        <p:sp>
+          <p:nvSpPr>
+            <p:cNvPr id="68" name="Down Arrow 67"/>
+            <p:cNvSpPr/>
+            <p:nvPr/>
+          </p:nvSpPr>
+          <p:spPr>
+            <a:xfrm>
+              <a:off x="1350200" y="4495800"/>
+              <a:ext cx="457200" cy="296450"/>
+            </a:xfrm>
+            <a:prstGeom prst="downArrow">
+              <a:avLst/>
+            </a:prstGeom>
+            <a:solidFill>
+              <a:schemeClr val="tx2">
+                <a:lumMod val="75000"/>
+              </a:schemeClr>
+            </a:solidFill>
+          </p:spPr>
+          <p:style>
+            <a:lnRef idx="2">
+              <a:schemeClr val="accent1">
+                <a:shade val="50000"/>
+              </a:schemeClr>
+            </a:lnRef>
+            <a:fillRef idx="1">
+              <a:schemeClr val="accent1"/>
+            </a:fillRef>
+            <a:effectRef idx="0">
+              <a:schemeClr val="accent1"/>
+            </a:effectRef>
+            <a:fontRef idx="minor">
+              <a:schemeClr val="lt1"/>
+            </a:fontRef>
+          </p:style>
+          <p:txBody>
+            <a:bodyPr rtlCol="0" anchor="ctr"/>
+            <a:lstStyle/>
+            <a:p>
+              <a:pPr algn="ctr"/>
+              <a:endParaRPr lang="en-US"/>
+            </a:p>
+          </p:txBody>
+        </p:sp>
+        <p:sp>
+          <p:nvSpPr>
+            <p:cNvPr id="69" name="Down Arrow 68"/>
+            <p:cNvSpPr/>
+            <p:nvPr/>
+          </p:nvSpPr>
+          <p:spPr>
+            <a:xfrm>
+              <a:off x="2983127" y="4500042"/>
+              <a:ext cx="457200" cy="304800"/>
+            </a:xfrm>
+            <a:prstGeom prst="downArrow">
+              <a:avLst/>
+            </a:prstGeom>
+            <a:solidFill>
+              <a:schemeClr val="tx2">
+                <a:lumMod val="75000"/>
+              </a:schemeClr>
+            </a:solidFill>
+          </p:spPr>
+          <p:style>
+            <a:lnRef idx="2">
+              <a:schemeClr val="accent1">
+                <a:shade val="50000"/>
+              </a:schemeClr>
+            </a:lnRef>
+            <a:fillRef idx="1">
+              <a:schemeClr val="accent1"/>
+            </a:fillRef>
+            <a:effectRef idx="0">
+              <a:schemeClr val="accent1"/>
+            </a:effectRef>
+            <a:fontRef idx="minor">
+              <a:schemeClr val="lt1"/>
+            </a:fontRef>
+          </p:style>
+          <p:txBody>
+            <a:bodyPr rtlCol="0" anchor="ctr"/>
+            <a:lstStyle/>
+            <a:p>
+              <a:pPr algn="ctr"/>
+              <a:endParaRPr lang="en-US"/>
+            </a:p>
+          </p:txBody>
+        </p:sp>
+        <p:grpSp>
+          <p:nvGrpSpPr>
+            <p:cNvPr id="1036" name="Group 1035"/>
+            <p:cNvGrpSpPr/>
+            <p:nvPr/>
+          </p:nvGrpSpPr>
+          <p:grpSpPr>
+            <a:xfrm>
+              <a:off x="925727" y="4849182"/>
+              <a:ext cx="2971800" cy="1171100"/>
+              <a:chOff x="952500" y="5185776"/>
+              <a:chExt cx="2971800" cy="1171100"/>
+            </a:xfrm>
+          </p:grpSpPr>
+          <p:sp>
+            <p:nvSpPr>
+              <p:cNvPr id="75" name="Round Same Side Corner Rectangle 74"/>
+              <p:cNvSpPr/>
+              <p:nvPr/>
+            </p:nvSpPr>
+            <p:spPr>
+              <a:xfrm>
+                <a:off x="952500" y="5185776"/>
+                <a:ext cx="2971800" cy="1171100"/>
+              </a:xfrm>
+              <a:prstGeom prst="round2SameRect">
+                <a:avLst/>
+              </a:prstGeom>
+              <a:solidFill>
+                <a:schemeClr val="accent2">
+                  <a:lumMod val="20000"/>
+                  <a:lumOff val="80000"/>
+                </a:schemeClr>
+              </a:solidFill>
+            </p:spPr>
+            <p:style>
+              <a:lnRef idx="2">
+                <a:schemeClr val="accent1">
+                  <a:shade val="50000"/>
+                </a:schemeClr>
+              </a:lnRef>
+              <a:fillRef idx="1">
+                <a:schemeClr val="accent1"/>
+              </a:fillRef>
+              <a:effectRef idx="0">
+                <a:schemeClr val="accent1"/>
+              </a:effectRef>
+              <a:fontRef idx="minor">
+                <a:schemeClr val="lt1"/>
+              </a:fontRef>
+            </p:style>
+            <p:txBody>
+              <a:bodyPr rtlCol="0" anchor="b"/>
+              <a:lstStyle/>
+              <a:p>
+                <a:pPr algn="r"/>
+                <a:r>
+                  <a:rPr lang="en-US" b="1" dirty="0" smtClean="0">
+                    <a:solidFill>
+                      <a:schemeClr val="tx1"/>
+                    </a:solidFill>
+                  </a:rPr>
+                  <a:t>Image Files</a:t>
+                </a:r>
+                <a:endParaRPr lang="en-US" b="1" dirty="0">
+                  <a:solidFill>
+                    <a:schemeClr val="tx1"/>
+                  </a:solidFill>
+                </a:endParaRPr>
+              </a:p>
+            </p:txBody>
+          </p:sp>
+          <p:grpSp>
+            <p:nvGrpSpPr>
+              <p:cNvPr id="1035" name="Group 1034"/>
+              <p:cNvGrpSpPr/>
+              <p:nvPr/>
+            </p:nvGrpSpPr>
+            <p:grpSpPr>
+              <a:xfrm>
+                <a:off x="1229981" y="5352436"/>
+                <a:ext cx="2532695" cy="675021"/>
+                <a:chOff x="1229981" y="5352436"/>
+                <a:chExt cx="2532695" cy="675021"/>
+              </a:xfrm>
+            </p:grpSpPr>
+            <p:pic>
+              <p:nvPicPr>
+                <p:cNvPr id="1034" name="Picture 3" descr="C:\Users\mandy\AppData\Local\Microsoft\Windows\Temporary Internet Files\Content.IE5\TML9OMGP\MC900441458[1].png"/>
+                <p:cNvPicPr>
+                  <a:picLocks noChangeAspect="1" noChangeArrowheads="1"/>
+                </p:cNvPicPr>
+                <p:nvPr/>
+              </p:nvPicPr>
+              <p:blipFill>
+                <a:blip r:embed="rId2" cstate="print">
+                  <a:extLst>
+                    <a:ext uri="{28A0092B-C50C-407E-A947-70E740481C1C}">
+                      <a14:useLocalDpi xmlns:a14="http://schemas.microsoft.com/office/drawing/2010/main" val="0"/>
+                    </a:ext>
+                  </a:extLst>
+                </a:blip>
+                <a:srcRect/>
+                <a:stretch>
+                  <a:fillRect/>
+                </a:stretch>
+              </p:blipFill>
+              <p:spPr bwMode="auto">
+                <a:xfrm>
+                  <a:off x="1229981" y="5352438"/>
+                  <a:ext cx="675019" cy="675019"/>
+                </a:xfrm>
+                <a:prstGeom prst="rect">
+                  <a:avLst/>
+                </a:prstGeom>
+                <a:solidFill>
+                  <a:schemeClr val="bg1">
+                    <a:lumMod val="75000"/>
+                  </a:schemeClr>
+                </a:solidFill>
+                <a:extLst>
+                  <a:ext uri="{909E8E84-426E-40DD-AFC4-6F175D3DCCD1}">
+                    <a14:hiddenFill xmlns:a14="http://schemas.microsoft.com/office/drawing/2010/main">
+                      <a:solidFill>
+                        <a:srgbClr val="FFFFFF"/>
+                      </a:solidFill>
+                    </a14:hiddenFill>
+                  </a:ext>
+                </a:extLst>
+              </p:spPr>
+            </p:pic>
+            <p:pic>
+              <p:nvPicPr>
+                <p:cNvPr id="72" name="Picture 3" descr="C:\Users\mandy\AppData\Local\Microsoft\Windows\Temporary Internet Files\Content.IE5\TML9OMGP\MC900441458[1].png"/>
+                <p:cNvPicPr>
+                  <a:picLocks noChangeAspect="1" noChangeArrowheads="1"/>
+                </p:cNvPicPr>
+                <p:nvPr/>
+              </p:nvPicPr>
+              <p:blipFill>
+                <a:blip r:embed="rId2" cstate="print">
+                  <a:extLst>
+                    <a:ext uri="{28A0092B-C50C-407E-A947-70E740481C1C}">
+                      <a14:useLocalDpi xmlns:a14="http://schemas.microsoft.com/office/drawing/2010/main" val="0"/>
+                    </a:ext>
+                  </a:extLst>
+                </a:blip>
+                <a:srcRect/>
+                <a:stretch>
+                  <a:fillRect/>
+                </a:stretch>
+              </p:blipFill>
+              <p:spPr bwMode="auto">
+                <a:xfrm>
+                  <a:off x="3087657" y="5352436"/>
+                  <a:ext cx="675019" cy="675019"/>
+                </a:xfrm>
+                <a:prstGeom prst="rect">
+                  <a:avLst/>
+                </a:prstGeom>
+                <a:solidFill>
+                  <a:schemeClr val="bg1">
+                    <a:lumMod val="75000"/>
+                  </a:schemeClr>
+                </a:solidFill>
+                <a:extLst>
+                  <a:ext uri="{909E8E84-426E-40DD-AFC4-6F175D3DCCD1}">
+                    <a14:hiddenFill xmlns:a14="http://schemas.microsoft.com/office/drawing/2010/main">
+                      <a:solidFill>
+                        <a:srgbClr val="FFFFFF"/>
+                      </a:solidFill>
+                    </a14:hiddenFill>
+                  </a:ext>
+                </a:extLst>
+              </p:spPr>
+            </p:pic>
+            <p:pic>
+              <p:nvPicPr>
+                <p:cNvPr id="73" name="Picture 3" descr="C:\Users\mandy\AppData\Local\Microsoft\Windows\Temporary Internet Files\Content.IE5\TML9OMGP\MC900441458[1].png"/>
+                <p:cNvPicPr>
+                  <a:picLocks noChangeAspect="1" noChangeArrowheads="1"/>
+                </p:cNvPicPr>
+                <p:nvPr/>
+              </p:nvPicPr>
+              <p:blipFill>
+                <a:blip r:embed="rId2" cstate="print">
+                  <a:extLst>
+                    <a:ext uri="{28A0092B-C50C-407E-A947-70E740481C1C}">
+                      <a14:useLocalDpi xmlns:a14="http://schemas.microsoft.com/office/drawing/2010/main" val="0"/>
+                    </a:ext>
+                  </a:extLst>
+                </a:blip>
+                <a:srcRect/>
+                <a:stretch>
+                  <a:fillRect/>
+                </a:stretch>
+              </p:blipFill>
+              <p:spPr bwMode="auto">
+                <a:xfrm>
+                  <a:off x="2140727" y="5352437"/>
+                  <a:ext cx="675019" cy="675019"/>
+                </a:xfrm>
+                <a:prstGeom prst="rect">
+                  <a:avLst/>
+                </a:prstGeom>
+                <a:solidFill>
+                  <a:schemeClr val="bg1">
+                    <a:lumMod val="75000"/>
+                  </a:schemeClr>
+                </a:solidFill>
+                <a:extLst>
+                  <a:ext uri="{909E8E84-426E-40DD-AFC4-6F175D3DCCD1}">
+                    <a14:hiddenFill xmlns:a14="http://schemas.microsoft.com/office/drawing/2010/main">
+                      <a:solidFill>
+                        <a:srgbClr val="FFFFFF"/>
+                      </a:solidFill>
+                    </a14:hiddenFill>
+                  </a:ext>
+                </a:extLst>
+              </p:spPr>
+            </p:pic>
+          </p:grpSp>
+        </p:grpSp>
+      </p:grpSp>
+      <p:grpSp>
+        <p:nvGrpSpPr>
+          <p:cNvPr id="1041" name="Group 1040"/>
+          <p:cNvGrpSpPr/>
+          <p:nvPr/>
+        </p:nvGrpSpPr>
+        <p:grpSpPr>
+          <a:xfrm>
+            <a:off x="4572000" y="1295400"/>
+            <a:ext cx="3733800" cy="5486402"/>
+            <a:chOff x="4787196" y="1142998"/>
+            <a:chExt cx="3733800" cy="5486402"/>
+          </a:xfrm>
+          <a:solidFill>
+            <a:schemeClr val="accent6">
+              <a:lumMod val="20000"/>
+              <a:lumOff val="80000"/>
+            </a:schemeClr>
+          </a:solidFill>
+        </p:grpSpPr>
+        <p:sp>
+          <p:nvSpPr>
+            <p:cNvPr id="1038" name="Rounded Rectangle 1037"/>
+            <p:cNvSpPr/>
+            <p:nvPr/>
+          </p:nvSpPr>
+          <p:spPr>
+            <a:xfrm>
+              <a:off x="4787196" y="1142998"/>
+              <a:ext cx="3733800" cy="5486402"/>
+            </a:xfrm>
+            <a:prstGeom prst="roundRect">
+              <a:avLst/>
+            </a:prstGeom>
+            <a:grpFill/>
+          </p:spPr>
+          <p:style>
+            <a:lnRef idx="2">
+              <a:schemeClr val="accent1">
+                <a:shade val="50000"/>
+              </a:schemeClr>
+            </a:lnRef>
+            <a:fillRef idx="1">
+              <a:schemeClr val="accent1"/>
+            </a:fillRef>
+            <a:effectRef idx="0">
+              <a:schemeClr val="accent1"/>
+            </a:effectRef>
+            <a:fontRef idx="minor">
+              <a:schemeClr val="lt1"/>
+            </a:fontRef>
+          </p:style>
+          <p:txBody>
+            <a:bodyPr rtlCol="0" anchor="t"/>
+            <a:lstStyle/>
+            <a:p>
+              <a:pPr algn="r"/>
+              <a:endParaRPr lang="en-US" dirty="0"/>
+            </a:p>
+          </p:txBody>
+        </p:sp>
+        <p:sp>
+          <p:nvSpPr>
+            <p:cNvPr id="20" name="Rounded Rectangle 19"/>
+            <p:cNvSpPr/>
+            <p:nvPr/>
+          </p:nvSpPr>
+          <p:spPr>
+            <a:xfrm>
+              <a:off x="5029200" y="2679526"/>
+              <a:ext cx="3276600" cy="342900"/>
+            </a:xfrm>
+            <a:prstGeom prst="roundRect">
+              <a:avLst/>
+            </a:prstGeom>
+            <a:solidFill>
+              <a:srgbClr val="CCFF99"/>
+            </a:solidFill>
+          </p:spPr>
+          <p:style>
+            <a:lnRef idx="2">
+              <a:schemeClr val="accent1">
+                <a:shade val="50000"/>
+              </a:schemeClr>
+            </a:lnRef>
+            <a:fillRef idx="1">
+              <a:schemeClr val="accent1"/>
+            </a:fillRef>
+            <a:effectRef idx="0">
+              <a:schemeClr val="accent1"/>
+            </a:effectRef>
+            <a:fontRef idx="minor">
+              <a:schemeClr val="lt1"/>
+            </a:fontRef>
+          </p:style>
+          <p:txBody>
+            <a:bodyPr rtlCol="0" anchor="ctr"/>
+            <a:lstStyle/>
+            <a:p>
+              <a:pPr algn="ctr"/>
+              <a:r>
+                <a:rPr lang="en-US" b="1" dirty="0" smtClean="0">
+                  <a:solidFill>
+                    <a:schemeClr val="tx1"/>
+                  </a:solidFill>
+                </a:rPr>
+                <a:t>Add To Database</a:t>
+              </a:r>
+              <a:endParaRPr lang="en-US" b="1" dirty="0">
+                <a:solidFill>
+                  <a:schemeClr val="tx1"/>
+                </a:solidFill>
+              </a:endParaRPr>
+            </a:p>
+          </p:txBody>
+        </p:sp>
+        <p:grpSp>
+          <p:nvGrpSpPr>
+            <p:cNvPr id="1040" name="Group 1039"/>
+            <p:cNvGrpSpPr/>
+            <p:nvPr/>
+          </p:nvGrpSpPr>
+          <p:grpSpPr>
+            <a:xfrm>
+              <a:off x="5029200" y="1447800"/>
+              <a:ext cx="3276600" cy="914400"/>
+              <a:chOff x="5029200" y="1447800"/>
+              <a:chExt cx="3276600" cy="914400"/>
+            </a:xfrm>
+            <a:grpFill/>
+          </p:grpSpPr>
+          <p:sp>
+            <p:nvSpPr>
+              <p:cNvPr id="41" name="Round Same Side Corner Rectangle 40"/>
+              <p:cNvSpPr/>
+              <p:nvPr/>
+            </p:nvSpPr>
+            <p:spPr>
+              <a:xfrm>
+                <a:off x="5029200" y="1447800"/>
+                <a:ext cx="3276600" cy="914400"/>
+              </a:xfrm>
+              <a:prstGeom prst="round2SameRect">
+                <a:avLst/>
+              </a:prstGeom>
+              <a:solidFill>
+                <a:schemeClr val="accent3">
+                  <a:lumMod val="40000"/>
+                  <a:lumOff val="60000"/>
+                </a:schemeClr>
+              </a:solidFill>
+            </p:spPr>
+            <p:style>
+              <a:lnRef idx="2">
+                <a:schemeClr val="accent1">
+                  <a:shade val="50000"/>
+                </a:schemeClr>
+              </a:lnRef>
+              <a:fillRef idx="1">
+                <a:schemeClr val="accent1"/>
+              </a:fillRef>
+              <a:effectRef idx="0">
+                <a:schemeClr val="accent1"/>
+              </a:effectRef>
+              <a:fontRef idx="minor">
+                <a:schemeClr val="lt1"/>
+              </a:fontRef>
+            </p:style>
+            <p:txBody>
+              <a:bodyPr rtlCol="0" anchor="b"/>
+              <a:lstStyle/>
+              <a:p>
+                <a:pPr algn="r"/>
+                <a:r>
+                  <a:rPr lang="en-US" b="1" dirty="0" err="1" smtClean="0">
+                    <a:solidFill>
+                      <a:schemeClr val="tx1"/>
+                    </a:solidFill>
+                  </a:rPr>
+                  <a:t>Perftrack</a:t>
+                </a:r>
+                <a:r>
+                  <a:rPr lang="en-US" b="1" dirty="0" smtClean="0">
+                    <a:solidFill>
+                      <a:schemeClr val="tx1"/>
+                    </a:solidFill>
+                  </a:rPr>
+                  <a:t> Data</a:t>
+                </a:r>
+                <a:endParaRPr lang="en-US" b="1" dirty="0">
+                  <a:solidFill>
+                    <a:schemeClr val="tx1"/>
+                  </a:solidFill>
+                </a:endParaRPr>
+              </a:p>
+            </p:txBody>
+          </p:sp>
+          <p:grpSp>
+            <p:nvGrpSpPr>
+              <p:cNvPr id="1030" name="Group 1029"/>
+              <p:cNvGrpSpPr/>
+              <p:nvPr/>
+            </p:nvGrpSpPr>
+            <p:grpSpPr>
+              <a:xfrm>
+                <a:off x="5388281" y="1589313"/>
+                <a:ext cx="2530258" cy="468087"/>
+                <a:chOff x="5388281" y="1485900"/>
+                <a:chExt cx="1794357" cy="606779"/>
+              </a:xfrm>
+              <a:grpFill/>
+            </p:grpSpPr>
+            <p:sp>
+              <p:nvSpPr>
+                <p:cNvPr id="1029" name="Folded Corner 1028"/>
+                <p:cNvSpPr/>
+                <p:nvPr/>
+              </p:nvSpPr>
+              <p:spPr>
+                <a:xfrm>
+                  <a:off x="5388281" y="1485901"/>
+                  <a:ext cx="762000" cy="606778"/>
+                </a:xfrm>
+                <a:prstGeom prst="foldedCorner">
+                  <a:avLst/>
+                </a:prstGeom>
+                <a:solidFill>
+                  <a:schemeClr val="bg1">
+                    <a:lumMod val="75000"/>
+                  </a:schemeClr>
+                </a:solidFill>
+              </p:spPr>
+              <p:style>
+                <a:lnRef idx="2">
+                  <a:schemeClr val="accent1">
+                    <a:shade val="50000"/>
+                  </a:schemeClr>
+                </a:lnRef>
+                <a:fillRef idx="1">
+                  <a:schemeClr val="accent1"/>
+                </a:fillRef>
+                <a:effectRef idx="0">
+                  <a:schemeClr val="accent1"/>
+                </a:effectRef>
+                <a:fontRef idx="minor">
+                  <a:schemeClr val="lt1"/>
+                </a:fontRef>
+              </p:style>
+              <p:txBody>
+                <a:bodyPr rtlCol="0" anchor="ctr"/>
+                <a:lstStyle/>
+                <a:p>
+                  <a:pPr algn="ctr"/>
+                  <a:r>
+                    <a:rPr lang="en-US" b="1" dirty="0" smtClean="0">
+                      <a:solidFill>
+                        <a:schemeClr val="tx1"/>
+                      </a:solidFill>
+                    </a:rPr>
+                    <a:t>PTDF</a:t>
+                  </a:r>
+                  <a:endParaRPr lang="en-US" b="1" dirty="0">
+                    <a:solidFill>
+                      <a:schemeClr val="tx1"/>
+                    </a:solidFill>
+                  </a:endParaRPr>
+                </a:p>
+              </p:txBody>
+            </p:sp>
+            <p:sp>
+              <p:nvSpPr>
+                <p:cNvPr id="39" name="Folded Corner 38"/>
+                <p:cNvSpPr/>
+                <p:nvPr/>
+              </p:nvSpPr>
+              <p:spPr>
+                <a:xfrm>
+                  <a:off x="6420638" y="1485900"/>
+                  <a:ext cx="762000" cy="606779"/>
+                </a:xfrm>
+                <a:prstGeom prst="foldedCorner">
+                  <a:avLst/>
+                </a:prstGeom>
+                <a:solidFill>
+                  <a:schemeClr val="bg1">
+                    <a:lumMod val="75000"/>
+                  </a:schemeClr>
+                </a:solidFill>
+              </p:spPr>
+              <p:style>
+                <a:lnRef idx="2">
+                  <a:schemeClr val="accent1">
+                    <a:shade val="50000"/>
+                  </a:schemeClr>
+                </a:lnRef>
+                <a:fillRef idx="1">
+                  <a:schemeClr val="accent1"/>
+                </a:fillRef>
+                <a:effectRef idx="0">
+                  <a:schemeClr val="accent1"/>
+                </a:effectRef>
+                <a:fontRef idx="minor">
+                  <a:schemeClr val="lt1"/>
+                </a:fontRef>
+              </p:style>
+              <p:txBody>
+                <a:bodyPr rtlCol="0" anchor="ctr"/>
+                <a:lstStyle/>
+                <a:p>
+                  <a:pPr algn="ctr"/>
+                  <a:r>
+                    <a:rPr lang="en-US" b="1" dirty="0" smtClean="0">
+                      <a:solidFill>
+                        <a:schemeClr val="tx1"/>
+                      </a:solidFill>
+                    </a:rPr>
+                    <a:t>PTDF</a:t>
+                  </a:r>
+                  <a:endParaRPr lang="en-US" b="1" dirty="0">
+                    <a:solidFill>
+                      <a:schemeClr val="tx1"/>
+                    </a:solidFill>
+                  </a:endParaRPr>
+                </a:p>
+              </p:txBody>
+            </p:sp>
+          </p:grpSp>
+        </p:grpSp>
+        <p:sp>
+          <p:nvSpPr>
+            <p:cNvPr id="21" name="Down Arrow 20"/>
+            <p:cNvSpPr/>
+            <p:nvPr/>
+          </p:nvSpPr>
+          <p:spPr>
+            <a:xfrm>
+              <a:off x="5638800" y="2370550"/>
+              <a:ext cx="457200" cy="296450"/>
+            </a:xfrm>
+            <a:prstGeom prst="downArrow">
+              <a:avLst/>
+            </a:prstGeom>
+            <a:solidFill>
+              <a:schemeClr val="tx2">
+                <a:lumMod val="75000"/>
+              </a:schemeClr>
+            </a:solidFill>
+          </p:spPr>
+          <p:style>
+            <a:lnRef idx="2">
+              <a:schemeClr val="accent1">
+                <a:shade val="50000"/>
+              </a:schemeClr>
+            </a:lnRef>
+            <a:fillRef idx="1">
+              <a:schemeClr val="accent1"/>
+            </a:fillRef>
+            <a:effectRef idx="0">
+              <a:schemeClr val="accent1"/>
+            </a:effectRef>
+            <a:fontRef idx="minor">
+              <a:schemeClr val="lt1"/>
+            </a:fontRef>
+          </p:style>
+          <p:txBody>
+            <a:bodyPr rtlCol="0" anchor="ctr"/>
+            <a:lstStyle/>
+            <a:p>
+              <a:pPr algn="ctr"/>
+              <a:endParaRPr lang="en-US"/>
+            </a:p>
+          </p:txBody>
+        </p:sp>
+        <p:sp>
+          <p:nvSpPr>
+            <p:cNvPr id="42" name="Down Arrow 41"/>
+            <p:cNvSpPr/>
+            <p:nvPr/>
+          </p:nvSpPr>
+          <p:spPr>
+            <a:xfrm>
+              <a:off x="7239000" y="2362200"/>
+              <a:ext cx="457200" cy="304800"/>
+            </a:xfrm>
+            <a:prstGeom prst="downArrow">
+              <a:avLst/>
+            </a:prstGeom>
+            <a:solidFill>
+              <a:schemeClr val="tx2">
+                <a:lumMod val="75000"/>
+              </a:schemeClr>
+            </a:solidFill>
+          </p:spPr>
+          <p:style>
+            <a:lnRef idx="2">
+              <a:schemeClr val="accent1">
+                <a:shade val="50000"/>
+              </a:schemeClr>
+            </a:lnRef>
+            <a:fillRef idx="1">
+              <a:schemeClr val="accent1"/>
+            </a:fillRef>
+            <a:effectRef idx="0">
+              <a:schemeClr val="accent1"/>
+            </a:effectRef>
+            <a:fontRef idx="minor">
+              <a:schemeClr val="lt1"/>
+            </a:fontRef>
+          </p:style>
+          <p:txBody>
+            <a:bodyPr rtlCol="0" anchor="ctr"/>
+            <a:lstStyle/>
+            <a:p>
+              <a:pPr algn="ctr"/>
+              <a:endParaRPr lang="en-US"/>
+            </a:p>
+          </p:txBody>
+        </p:sp>
+        <p:grpSp>
+          <p:nvGrpSpPr>
+            <p:cNvPr id="1031" name="Group 1030"/>
+            <p:cNvGrpSpPr/>
+            <p:nvPr/>
+          </p:nvGrpSpPr>
+          <p:grpSpPr>
+            <a:xfrm>
+              <a:off x="5029200" y="3346620"/>
+              <a:ext cx="3276600" cy="996780"/>
+              <a:chOff x="5182644" y="3200400"/>
+              <a:chExt cx="2971800" cy="1143000"/>
+            </a:xfrm>
+            <a:grpFill/>
+          </p:grpSpPr>
+          <p:sp>
+            <p:nvSpPr>
+              <p:cNvPr id="51" name="Round Same Side Corner Rectangle 50"/>
+              <p:cNvSpPr/>
+              <p:nvPr/>
+            </p:nvSpPr>
+            <p:spPr>
+              <a:xfrm>
+                <a:off x="5182644" y="3200400"/>
+                <a:ext cx="2971800" cy="1143000"/>
+              </a:xfrm>
+              <a:prstGeom prst="round2SameRect">
+                <a:avLst/>
+              </a:prstGeom>
+              <a:solidFill>
+                <a:schemeClr val="accent3">
+                  <a:lumMod val="40000"/>
+                  <a:lumOff val="60000"/>
+                </a:schemeClr>
+              </a:solidFill>
+            </p:spPr>
+            <p:style>
+              <a:lnRef idx="2">
+                <a:schemeClr val="accent1">
+                  <a:shade val="50000"/>
+                </a:schemeClr>
+              </a:lnRef>
+              <a:fillRef idx="1">
+                <a:schemeClr val="accent1"/>
+              </a:fillRef>
+              <a:effectRef idx="0">
+                <a:schemeClr val="accent1"/>
+              </a:effectRef>
+              <a:fontRef idx="minor">
+                <a:schemeClr val="lt1"/>
+              </a:fontRef>
+            </p:style>
+            <p:txBody>
+              <a:bodyPr rtlCol="0" anchor="b"/>
+              <a:lstStyle/>
+              <a:p>
+                <a:pPr algn="r"/>
+                <a:r>
+                  <a:rPr lang="en-US" b="1" dirty="0">
+                    <a:solidFill>
+                      <a:schemeClr val="tx1"/>
+                    </a:solidFill>
+                  </a:rPr>
+                  <a:t>Database Engine</a:t>
+                </a:r>
+              </a:p>
+            </p:txBody>
+          </p:sp>
+          <p:grpSp>
+            <p:nvGrpSpPr>
+              <p:cNvPr id="23" name="Group 22"/>
+              <p:cNvGrpSpPr/>
+              <p:nvPr/>
+            </p:nvGrpSpPr>
+            <p:grpSpPr>
+              <a:xfrm>
+                <a:off x="5414540" y="3260934"/>
+                <a:ext cx="1010956" cy="745821"/>
+                <a:chOff x="6629400" y="3124200"/>
+                <a:chExt cx="964504" cy="965548"/>
+              </a:xfrm>
+              <a:grpFill/>
+            </p:grpSpPr>
+            <p:sp>
+              <p:nvSpPr>
+                <p:cNvPr id="22" name="Flowchart: Magnetic Disk 21"/>
+                <p:cNvSpPr/>
+                <p:nvPr/>
+              </p:nvSpPr>
+              <p:spPr>
+                <a:xfrm>
+                  <a:off x="6629400" y="3124200"/>
+                  <a:ext cx="457200" cy="685800"/>
+                </a:xfrm>
+                <a:prstGeom prst="flowChartMagneticDisk">
+                  <a:avLst/>
+                </a:prstGeom>
+                <a:solidFill>
+                  <a:schemeClr val="bg1">
+                    <a:lumMod val="75000"/>
+                  </a:schemeClr>
+                </a:solidFill>
+              </p:spPr>
+              <p:style>
+                <a:lnRef idx="2">
+                  <a:schemeClr val="accent1">
+                    <a:shade val="50000"/>
+                  </a:schemeClr>
+                </a:lnRef>
+                <a:fillRef idx="1">
+                  <a:schemeClr val="accent1"/>
+                </a:fillRef>
+                <a:effectRef idx="0">
+                  <a:schemeClr val="accent1"/>
+                </a:effectRef>
+                <a:fontRef idx="minor">
+                  <a:schemeClr val="lt1"/>
+                </a:fontRef>
+              </p:style>
+              <p:txBody>
+                <a:bodyPr rtlCol="0" anchor="ctr"/>
+                <a:lstStyle/>
+                <a:p>
+                  <a:pPr algn="ctr"/>
+                  <a:endParaRPr lang="en-US" b="1">
+                    <a:solidFill>
+                      <a:schemeClr val="tx1"/>
+                    </a:solidFill>
+                  </a:endParaRPr>
+                </a:p>
+              </p:txBody>
+            </p:sp>
+            <p:sp>
+              <p:nvSpPr>
+                <p:cNvPr id="25" name="Flowchart: Magnetic Disk 24"/>
+                <p:cNvSpPr/>
+                <p:nvPr/>
+              </p:nvSpPr>
+              <p:spPr>
+                <a:xfrm>
+                  <a:off x="7136704" y="3124200"/>
+                  <a:ext cx="457200" cy="685800"/>
+                </a:xfrm>
+                <a:prstGeom prst="flowChartMagneticDisk">
+                  <a:avLst/>
+                </a:prstGeom>
+                <a:solidFill>
+                  <a:schemeClr val="bg1">
+                    <a:lumMod val="75000"/>
+                  </a:schemeClr>
+                </a:solidFill>
+              </p:spPr>
+              <p:style>
+                <a:lnRef idx="2">
+                  <a:schemeClr val="accent1">
+                    <a:shade val="50000"/>
+                  </a:schemeClr>
+                </a:lnRef>
+                <a:fillRef idx="1">
+                  <a:schemeClr val="accent1"/>
+                </a:fillRef>
+                <a:effectRef idx="0">
+                  <a:schemeClr val="accent1"/>
+                </a:effectRef>
+                <a:fontRef idx="minor">
+                  <a:schemeClr val="lt1"/>
+                </a:fontRef>
+              </p:style>
+              <p:txBody>
+                <a:bodyPr rtlCol="0" anchor="ctr"/>
+                <a:lstStyle/>
+                <a:p>
+                  <a:pPr algn="ctr"/>
+                  <a:endParaRPr lang="en-US" b="1">
+                    <a:solidFill>
+                      <a:schemeClr val="tx1"/>
+                    </a:solidFill>
+                  </a:endParaRPr>
+                </a:p>
+              </p:txBody>
+            </p:sp>
+            <p:sp>
+              <p:nvSpPr>
+                <p:cNvPr id="24" name="Flowchart: Magnetic Disk 23"/>
+                <p:cNvSpPr/>
+                <p:nvPr/>
+              </p:nvSpPr>
+              <p:spPr>
+                <a:xfrm>
+                  <a:off x="6841299" y="3403948"/>
+                  <a:ext cx="457200" cy="685800"/>
+                </a:xfrm>
+                <a:prstGeom prst="flowChartMagneticDisk">
+                  <a:avLst/>
+                </a:prstGeom>
+                <a:solidFill>
+                  <a:schemeClr val="bg1">
+                    <a:lumMod val="75000"/>
+                  </a:schemeClr>
+                </a:solidFill>
+              </p:spPr>
+              <p:style>
+                <a:lnRef idx="2">
+                  <a:schemeClr val="accent1">
+                    <a:shade val="50000"/>
+                  </a:schemeClr>
+                </a:lnRef>
+                <a:fillRef idx="1">
+                  <a:schemeClr val="accent1"/>
+                </a:fillRef>
+                <a:effectRef idx="0">
+                  <a:schemeClr val="accent1"/>
+                </a:effectRef>
+                <a:fontRef idx="minor">
+                  <a:schemeClr val="lt1"/>
+                </a:fontRef>
+              </p:style>
+              <p:txBody>
+                <a:bodyPr rtlCol="0" anchor="ctr"/>
+                <a:lstStyle/>
+                <a:p>
+                  <a:pPr algn="ctr"/>
+                  <a:endParaRPr lang="en-US" b="1">
+                    <a:solidFill>
+                      <a:schemeClr val="tx1"/>
+                    </a:solidFill>
+                  </a:endParaRPr>
+                </a:p>
+              </p:txBody>
+            </p:sp>
+          </p:grpSp>
+          <p:grpSp>
+            <p:nvGrpSpPr>
+              <p:cNvPr id="47" name="Group 46"/>
+              <p:cNvGrpSpPr/>
+              <p:nvPr/>
+            </p:nvGrpSpPr>
+            <p:grpSpPr>
+              <a:xfrm>
+                <a:off x="6853233" y="3260934"/>
+                <a:ext cx="1010956" cy="745821"/>
+                <a:chOff x="6629400" y="3124200"/>
+                <a:chExt cx="964504" cy="965548"/>
+              </a:xfrm>
+              <a:grpFill/>
+            </p:grpSpPr>
+            <p:sp>
+              <p:nvSpPr>
+                <p:cNvPr id="48" name="Flowchart: Magnetic Disk 47"/>
+                <p:cNvSpPr/>
+                <p:nvPr/>
+              </p:nvSpPr>
+              <p:spPr>
+                <a:xfrm>
+                  <a:off x="6629400" y="3124200"/>
+                  <a:ext cx="457200" cy="685800"/>
+                </a:xfrm>
+                <a:prstGeom prst="flowChartMagneticDisk">
+                  <a:avLst/>
+                </a:prstGeom>
+                <a:solidFill>
+                  <a:schemeClr val="bg1">
+                    <a:lumMod val="75000"/>
+                  </a:schemeClr>
+                </a:solidFill>
+              </p:spPr>
+              <p:style>
+                <a:lnRef idx="2">
+                  <a:schemeClr val="accent1">
+                    <a:shade val="50000"/>
+                  </a:schemeClr>
+                </a:lnRef>
+                <a:fillRef idx="1">
+                  <a:schemeClr val="accent1"/>
+                </a:fillRef>
+                <a:effectRef idx="0">
+                  <a:schemeClr val="accent1"/>
+                </a:effectRef>
+                <a:fontRef idx="minor">
+                  <a:schemeClr val="lt1"/>
+                </a:fontRef>
+              </p:style>
+              <p:txBody>
+                <a:bodyPr rtlCol="0" anchor="ctr"/>
+                <a:lstStyle/>
+                <a:p>
+                  <a:pPr algn="ctr"/>
+                  <a:endParaRPr lang="en-US" b="1">
+                    <a:solidFill>
+                      <a:schemeClr val="tx1"/>
+                    </a:solidFill>
+                  </a:endParaRPr>
+                </a:p>
+              </p:txBody>
+            </p:sp>
+            <p:sp>
+              <p:nvSpPr>
+                <p:cNvPr id="49" name="Flowchart: Magnetic Disk 48"/>
+                <p:cNvSpPr/>
+                <p:nvPr/>
+              </p:nvSpPr>
+              <p:spPr>
+                <a:xfrm>
+                  <a:off x="7136704" y="3124200"/>
+                  <a:ext cx="457200" cy="685800"/>
+                </a:xfrm>
+                <a:prstGeom prst="flowChartMagneticDisk">
+                  <a:avLst/>
+                </a:prstGeom>
+                <a:solidFill>
+                  <a:schemeClr val="bg1">
+                    <a:lumMod val="75000"/>
+                  </a:schemeClr>
+                </a:solidFill>
+              </p:spPr>
+              <p:style>
+                <a:lnRef idx="2">
+                  <a:schemeClr val="accent1">
+                    <a:shade val="50000"/>
+                  </a:schemeClr>
+                </a:lnRef>
+                <a:fillRef idx="1">
+                  <a:schemeClr val="accent1"/>
+                </a:fillRef>
+                <a:effectRef idx="0">
+                  <a:schemeClr val="accent1"/>
+                </a:effectRef>
+                <a:fontRef idx="minor">
+                  <a:schemeClr val="lt1"/>
+                </a:fontRef>
+              </p:style>
+              <p:txBody>
+                <a:bodyPr rtlCol="0" anchor="ctr"/>
+                <a:lstStyle/>
+                <a:p>
+                  <a:pPr algn="ctr"/>
+                  <a:endParaRPr lang="en-US" b="1">
+                    <a:solidFill>
+                      <a:schemeClr val="tx1"/>
+                    </a:solidFill>
+                  </a:endParaRPr>
+                </a:p>
+              </p:txBody>
+            </p:sp>
+            <p:sp>
+              <p:nvSpPr>
+                <p:cNvPr id="50" name="Flowchart: Magnetic Disk 49"/>
+                <p:cNvSpPr/>
+                <p:nvPr/>
+              </p:nvSpPr>
+              <p:spPr>
+                <a:xfrm>
+                  <a:off x="6841299" y="3403948"/>
+                  <a:ext cx="457200" cy="685800"/>
+                </a:xfrm>
+                <a:prstGeom prst="flowChartMagneticDisk">
+                  <a:avLst/>
+                </a:prstGeom>
+                <a:solidFill>
+                  <a:schemeClr val="bg1">
+                    <a:lumMod val="75000"/>
+                  </a:schemeClr>
+                </a:solidFill>
+              </p:spPr>
+              <p:style>
+                <a:lnRef idx="2">
+                  <a:schemeClr val="accent1">
+                    <a:shade val="50000"/>
+                  </a:schemeClr>
+                </a:lnRef>
+                <a:fillRef idx="1">
+                  <a:schemeClr val="accent1"/>
+                </a:fillRef>
+                <a:effectRef idx="0">
+                  <a:schemeClr val="accent1"/>
+                </a:effectRef>
+                <a:fontRef idx="minor">
+                  <a:schemeClr val="lt1"/>
+                </a:fontRef>
+              </p:style>
+              <p:txBody>
+                <a:bodyPr rtlCol="0" anchor="ctr"/>
+                <a:lstStyle/>
+                <a:p>
+                  <a:pPr algn="ctr"/>
+                  <a:endParaRPr lang="en-US" b="1">
+                    <a:solidFill>
+                      <a:schemeClr val="tx1"/>
+                    </a:solidFill>
+                  </a:endParaRPr>
+                </a:p>
+              </p:txBody>
+            </p:sp>
+          </p:grpSp>
+        </p:grpSp>
+        <p:sp>
+          <p:nvSpPr>
+            <p:cNvPr id="53" name="Down Arrow 52"/>
+            <p:cNvSpPr/>
+            <p:nvPr/>
+          </p:nvSpPr>
+          <p:spPr>
+            <a:xfrm>
+              <a:off x="5638800" y="3022948"/>
+              <a:ext cx="457200" cy="296450"/>
+            </a:xfrm>
+            <a:prstGeom prst="downArrow">
+              <a:avLst/>
+            </a:prstGeom>
+            <a:solidFill>
+              <a:schemeClr val="tx2">
+                <a:lumMod val="75000"/>
+              </a:schemeClr>
+            </a:solidFill>
+          </p:spPr>
+          <p:style>
+            <a:lnRef idx="2">
+              <a:schemeClr val="accent1">
+                <a:shade val="50000"/>
+              </a:schemeClr>
+            </a:lnRef>
+            <a:fillRef idx="1">
+              <a:schemeClr val="accent1"/>
+            </a:fillRef>
+            <a:effectRef idx="0">
+              <a:schemeClr val="accent1"/>
+            </a:effectRef>
+            <a:fontRef idx="minor">
+              <a:schemeClr val="lt1"/>
+            </a:fontRef>
+          </p:style>
+          <p:txBody>
+            <a:bodyPr rtlCol="0" anchor="ctr"/>
+            <a:lstStyle/>
+            <a:p>
+              <a:pPr algn="ctr"/>
+              <a:endParaRPr lang="en-US"/>
+            </a:p>
+          </p:txBody>
+        </p:sp>
+        <p:sp>
+          <p:nvSpPr>
+            <p:cNvPr id="54" name="Down Arrow 53"/>
+            <p:cNvSpPr/>
+            <p:nvPr/>
+          </p:nvSpPr>
+          <p:spPr>
+            <a:xfrm>
+              <a:off x="7239000" y="3022948"/>
+              <a:ext cx="457200" cy="304800"/>
+            </a:xfrm>
+            <a:prstGeom prst="downArrow">
+              <a:avLst/>
+            </a:prstGeom>
+            <a:solidFill>
+              <a:schemeClr val="tx2">
+                <a:lumMod val="75000"/>
+              </a:schemeClr>
+            </a:solidFill>
+          </p:spPr>
+          <p:style>
+            <a:lnRef idx="2">
+              <a:schemeClr val="accent1">
+                <a:shade val="50000"/>
+              </a:schemeClr>
+            </a:lnRef>
+            <a:fillRef idx="1">
+              <a:schemeClr val="accent1"/>
+            </a:fillRef>
+            <a:effectRef idx="0">
+              <a:schemeClr val="accent1"/>
+            </a:effectRef>
+            <a:fontRef idx="minor">
+              <a:schemeClr val="lt1"/>
+            </a:fontRef>
+          </p:style>
+          <p:txBody>
+            <a:bodyPr rtlCol="0" anchor="ctr"/>
+            <a:lstStyle/>
+            <a:p>
+              <a:pPr algn="ctr"/>
+              <a:endParaRPr lang="en-US"/>
+            </a:p>
+          </p:txBody>
+        </p:sp>
+        <p:sp>
+          <p:nvSpPr>
+            <p:cNvPr id="56" name="Down Arrow 55"/>
+            <p:cNvSpPr/>
+            <p:nvPr/>
+          </p:nvSpPr>
+          <p:spPr>
+            <a:xfrm>
+              <a:off x="6425496" y="4343400"/>
+              <a:ext cx="457200" cy="296450"/>
+            </a:xfrm>
+            <a:prstGeom prst="downArrow">
+              <a:avLst/>
+            </a:prstGeom>
+            <a:solidFill>
+              <a:schemeClr val="tx2">
+                <a:lumMod val="75000"/>
+              </a:schemeClr>
+            </a:solidFill>
+          </p:spPr>
+          <p:style>
+            <a:lnRef idx="2">
+              <a:schemeClr val="accent1">
+                <a:shade val="50000"/>
+              </a:schemeClr>
+            </a:lnRef>
+            <a:fillRef idx="1">
+              <a:schemeClr val="accent1"/>
+            </a:fillRef>
+            <a:effectRef idx="0">
+              <a:schemeClr val="accent1"/>
+            </a:effectRef>
+            <a:fontRef idx="minor">
+              <a:schemeClr val="lt1"/>
+            </a:fontRef>
+          </p:style>
+          <p:txBody>
+            <a:bodyPr rtlCol="0" anchor="ctr"/>
+            <a:lstStyle/>
+            <a:p>
+              <a:pPr algn="ctr"/>
+              <a:endParaRPr lang="en-US"/>
+            </a:p>
+          </p:txBody>
+        </p:sp>
+        <p:grpSp>
+          <p:nvGrpSpPr>
+            <p:cNvPr id="1037" name="Group 1036"/>
+            <p:cNvGrpSpPr/>
+            <p:nvPr/>
+          </p:nvGrpSpPr>
+          <p:grpSpPr>
+            <a:xfrm>
+              <a:off x="5029200" y="4648200"/>
+              <a:ext cx="3276600" cy="1828800"/>
+              <a:chOff x="5029200" y="4876800"/>
+              <a:chExt cx="3276600" cy="1828800"/>
+            </a:xfrm>
+            <a:grpFill/>
+          </p:grpSpPr>
+          <p:sp>
+            <p:nvSpPr>
+              <p:cNvPr id="28" name="Rounded Rectangle 27"/>
+              <p:cNvSpPr/>
+              <p:nvPr/>
+            </p:nvSpPr>
+            <p:spPr>
+              <a:xfrm>
+                <a:off x="5029200" y="4876800"/>
+                <a:ext cx="3276600" cy="1828800"/>
+              </a:xfrm>
+              <a:prstGeom prst="roundRect">
+                <a:avLst/>
+              </a:prstGeom>
+              <a:solidFill>
+                <a:srgbClr val="CCFF99"/>
+              </a:solidFill>
+            </p:spPr>
+            <p:style>
+              <a:lnRef idx="2">
+                <a:schemeClr val="accent1">
+                  <a:shade val="50000"/>
+                </a:schemeClr>
+              </a:lnRef>
+              <a:fillRef idx="1">
+                <a:schemeClr val="accent1"/>
+              </a:fillRef>
+              <a:effectRef idx="0">
+                <a:schemeClr val="accent1"/>
+              </a:effectRef>
+              <a:fontRef idx="minor">
+                <a:schemeClr val="lt1"/>
+              </a:fontRef>
+            </p:style>
+            <p:txBody>
+              <a:bodyPr rtlCol="0" anchor="b"/>
+              <a:lstStyle/>
+              <a:p>
+                <a:pPr algn="r"/>
+                <a:r>
+                  <a:rPr lang="en-US" b="1" dirty="0" err="1" smtClean="0">
+                    <a:solidFill>
+                      <a:schemeClr val="tx1"/>
+                    </a:solidFill>
+                  </a:rPr>
+                  <a:t>Perftrack</a:t>
+                </a:r>
+                <a:endParaRPr lang="en-US" b="1" dirty="0">
+                  <a:solidFill>
+                    <a:schemeClr val="tx1"/>
+                  </a:solidFill>
+                </a:endParaRPr>
+              </a:p>
+            </p:txBody>
+          </p:sp>
+          <p:sp>
+            <p:nvSpPr>
+              <p:cNvPr id="29" name="Rounded Rectangle 28"/>
+              <p:cNvSpPr/>
+              <p:nvPr/>
+            </p:nvSpPr>
+            <p:spPr>
+              <a:xfrm>
+                <a:off x="5182644" y="5473044"/>
+                <a:ext cx="1443810" cy="394356"/>
+              </a:xfrm>
+              <a:prstGeom prst="roundRect">
+                <a:avLst/>
+              </a:prstGeom>
+              <a:solidFill>
+                <a:schemeClr val="accent5">
+                  <a:lumMod val="60000"/>
+                  <a:lumOff val="40000"/>
+                </a:schemeClr>
+              </a:solidFill>
+            </p:spPr>
+            <p:style>
+              <a:lnRef idx="2">
+                <a:schemeClr val="accent1">
+                  <a:shade val="50000"/>
+                </a:schemeClr>
+              </a:lnRef>
+              <a:fillRef idx="1">
+                <a:schemeClr val="accent1"/>
+              </a:fillRef>
+              <a:effectRef idx="0">
+                <a:schemeClr val="accent1"/>
+              </a:effectRef>
+              <a:fontRef idx="minor">
+                <a:schemeClr val="lt1"/>
+              </a:fontRef>
+            </p:style>
+            <p:txBody>
+              <a:bodyPr rtlCol="0" anchor="ctr"/>
+              <a:lstStyle/>
+              <a:p>
+                <a:pPr algn="ctr"/>
+                <a:r>
+                  <a:rPr lang="en-US" b="1" dirty="0" smtClean="0">
+                    <a:solidFill>
+                      <a:schemeClr val="tx1"/>
+                    </a:solidFill>
+                  </a:rPr>
+                  <a:t>Plot Graphs</a:t>
+                </a:r>
+                <a:endParaRPr lang="en-US" b="1" dirty="0">
+                  <a:solidFill>
+                    <a:schemeClr val="tx1"/>
+                  </a:solidFill>
+                </a:endParaRPr>
+              </a:p>
+            </p:txBody>
+          </p:sp>
+          <p:sp>
+            <p:nvSpPr>
+              <p:cNvPr id="30" name="Rounded Rectangle 29"/>
+              <p:cNvSpPr/>
+              <p:nvPr/>
+            </p:nvSpPr>
+            <p:spPr>
+              <a:xfrm>
+                <a:off x="6668544" y="5473044"/>
+                <a:ext cx="1485900" cy="394356"/>
+              </a:xfrm>
+              <a:prstGeom prst="roundRect">
+                <a:avLst/>
+              </a:prstGeom>
+              <a:solidFill>
+                <a:srgbClr val="FFFF00"/>
+              </a:solidFill>
+            </p:spPr>
+            <p:style>
+              <a:lnRef idx="2">
+                <a:schemeClr val="accent1">
+                  <a:shade val="50000"/>
+                </a:schemeClr>
+              </a:lnRef>
+              <a:fillRef idx="1">
+                <a:schemeClr val="accent1"/>
+              </a:fillRef>
+              <a:effectRef idx="0">
+                <a:schemeClr val="accent1"/>
+              </a:effectRef>
+              <a:fontRef idx="minor">
+                <a:schemeClr val="lt1"/>
+              </a:fontRef>
+            </p:style>
+            <p:txBody>
+              <a:bodyPr rtlCol="0" anchor="ctr"/>
+              <a:lstStyle/>
+              <a:p>
+                <a:pPr algn="ctr"/>
+                <a:r>
+                  <a:rPr lang="en-US" b="1" dirty="0" smtClean="0">
+                    <a:solidFill>
+                      <a:schemeClr val="tx1"/>
+                    </a:solidFill>
+                  </a:rPr>
+                  <a:t>Cluster Data</a:t>
+                </a:r>
+                <a:endParaRPr lang="en-US" b="1" dirty="0">
+                  <a:solidFill>
+                    <a:schemeClr val="tx1"/>
+                  </a:solidFill>
+                </a:endParaRPr>
+              </a:p>
+            </p:txBody>
+          </p:sp>
+          <p:sp>
+            <p:nvSpPr>
+              <p:cNvPr id="1027" name="Rounded Rectangle 1026"/>
+              <p:cNvSpPr/>
+              <p:nvPr/>
+            </p:nvSpPr>
+            <p:spPr>
+              <a:xfrm>
+                <a:off x="5182644" y="5981700"/>
+                <a:ext cx="2971800" cy="342900"/>
+              </a:xfrm>
+              <a:prstGeom prst="roundRect">
+                <a:avLst/>
+              </a:prstGeom>
+              <a:solidFill>
+                <a:schemeClr val="accent5">
+                  <a:lumMod val="60000"/>
+                  <a:lumOff val="40000"/>
+                </a:schemeClr>
+              </a:solidFill>
+            </p:spPr>
+            <p:style>
+              <a:lnRef idx="2">
+                <a:schemeClr val="accent1">
+                  <a:shade val="50000"/>
+                </a:schemeClr>
+              </a:lnRef>
+              <a:fillRef idx="1">
+                <a:schemeClr val="accent1"/>
+              </a:fillRef>
+              <a:effectRef idx="0">
+                <a:schemeClr val="accent1"/>
+              </a:effectRef>
+              <a:fontRef idx="minor">
+                <a:schemeClr val="lt1"/>
+              </a:fontRef>
+            </p:style>
+            <p:txBody>
+              <a:bodyPr rtlCol="0" anchor="ctr"/>
+              <a:lstStyle/>
+              <a:p>
+                <a:pPr algn="ctr"/>
+                <a:r>
+                  <a:rPr lang="en-US" b="1" dirty="0" smtClean="0">
+                    <a:solidFill>
+                      <a:schemeClr val="tx1"/>
+                    </a:solidFill>
+                  </a:rPr>
+                  <a:t>Graphical User Interface</a:t>
+                </a:r>
+                <a:endParaRPr lang="en-US" b="1" dirty="0">
+                  <a:solidFill>
+                    <a:schemeClr val="tx1"/>
+                  </a:solidFill>
+                </a:endParaRPr>
+              </a:p>
+            </p:txBody>
+          </p:sp>
+          <p:sp>
+            <p:nvSpPr>
+              <p:cNvPr id="86" name="Rounded Rectangle 85"/>
+              <p:cNvSpPr/>
+              <p:nvPr/>
+            </p:nvSpPr>
+            <p:spPr>
+              <a:xfrm>
+                <a:off x="5168196" y="5010451"/>
+                <a:ext cx="2971800" cy="342900"/>
+              </a:xfrm>
+              <a:prstGeom prst="roundRect">
+                <a:avLst/>
+              </a:prstGeom>
+              <a:solidFill>
+                <a:schemeClr val="accent5">
+                  <a:lumMod val="60000"/>
+                  <a:lumOff val="40000"/>
+                </a:schemeClr>
+              </a:solidFill>
+            </p:spPr>
+            <p:style>
+              <a:lnRef idx="2">
+                <a:schemeClr val="accent1">
+                  <a:shade val="50000"/>
+                </a:schemeClr>
+              </a:lnRef>
+              <a:fillRef idx="1">
+                <a:schemeClr val="accent1"/>
+              </a:fillRef>
+              <a:effectRef idx="0">
+                <a:schemeClr val="accent1"/>
+              </a:effectRef>
+              <a:fontRef idx="minor">
+                <a:schemeClr val="lt1"/>
+              </a:fontRef>
+            </p:style>
+            <p:txBody>
+              <a:bodyPr rtlCol="0" anchor="ctr"/>
+              <a:lstStyle/>
+              <a:p>
+                <a:pPr algn="ctr"/>
+                <a:r>
+                  <a:rPr lang="en-US" b="1" dirty="0" smtClean="0">
+                    <a:solidFill>
+                      <a:schemeClr val="tx1"/>
+                    </a:solidFill>
+                  </a:rPr>
+                  <a:t>Get Data from Database</a:t>
+                </a:r>
+                <a:endParaRPr lang="en-US" b="1" dirty="0">
+                  <a:solidFill>
+                    <a:schemeClr val="tx1"/>
+                  </a:solidFill>
+                </a:endParaRPr>
+              </a:p>
+            </p:txBody>
+          </p:sp>
+        </p:grpSp>
+      </p:grpSp>
+      <p:sp>
+        <p:nvSpPr>
+          <p:cNvPr id="1043" name="Rounded Rectangle 1042"/>
+          <p:cNvSpPr/>
+          <p:nvPr/>
+        </p:nvSpPr>
+        <p:spPr>
+          <a:xfrm>
+            <a:off x="1371600" y="1153885"/>
+            <a:ext cx="2209800" cy="446315"/>
+          </a:xfrm>
+          <a:prstGeom prst="roundRect">
+            <a:avLst/>
+          </a:prstGeom>
+          <a:solidFill>
+            <a:schemeClr val="tx2"/>
+          </a:solidFill>
+        </p:spPr>
+        <p:style>
+          <a:lnRef idx="2">
+            <a:schemeClr val="accent1">
+              <a:shade val="50000"/>
+            </a:schemeClr>
+          </a:lnRef>
+          <a:fillRef idx="1">
+            <a:schemeClr val="accent1"/>
+          </a:fillRef>
+          <a:effectRef idx="0">
+            <a:schemeClr val="accent1"/>
+          </a:effectRef>
+          <a:fontRef idx="minor">
+            <a:schemeClr val="lt1"/>
+          </a:fontRef>
+        </p:style>
+        <p:txBody>
+          <a:bodyPr rtlCol="0" anchor="ctr"/>
           <a:lstStyle/>
           <a:p>
-            <a:r>
-              <a:rPr lang="en-US" sz="2400" dirty="0" smtClean="0"/>
-              <a:t>A set of custom tools was written to work with sensor data provided in CSV format</a:t>
-            </a:r>
-          </a:p>
-          <a:p>
-            <a:pPr marL="114300" indent="0">
-              <a:buNone/>
-            </a:pPr>
-            <a:endParaRPr lang="en-US" sz="2400" dirty="0" smtClean="0"/>
-          </a:p>
-          <a:p>
-            <a:r>
-              <a:rPr lang="en-US" sz="2400" dirty="0" smtClean="0"/>
-              <a:t>Mostly Haskell with calls to </a:t>
-            </a:r>
-            <a:r>
-              <a:rPr lang="en-US" sz="2400" dirty="0" err="1" smtClean="0"/>
-              <a:t>Gnuplot</a:t>
-            </a:r>
-            <a:r>
-              <a:rPr lang="en-US" sz="2400" dirty="0" smtClean="0"/>
-              <a:t> (earlier prototypes also used C, Perl and shell)</a:t>
-            </a:r>
-          </a:p>
-          <a:p>
-            <a:pPr marL="114300" indent="0">
-              <a:buNone/>
-            </a:pPr>
-            <a:endParaRPr lang="en-US" sz="2400" dirty="0" smtClean="0"/>
-          </a:p>
-          <a:p>
-            <a:r>
-              <a:rPr lang="en-US" sz="2400" dirty="0" smtClean="0"/>
-              <a:t>Generates a complete report including tables and graphs</a:t>
-            </a:r>
-          </a:p>
-          <a:p>
-            <a:pPr marL="114300" indent="0">
-              <a:buNone/>
-            </a:pPr>
-            <a:endParaRPr lang="en-US" sz="2400" dirty="0" smtClean="0"/>
-          </a:p>
-          <a:p>
-            <a:r>
-              <a:rPr lang="en-US" sz="2400" dirty="0" smtClean="0"/>
-              <a:t>Calculates and graphs metrics such as temperature deltas, COP (coefficient of performance) and power usage</a:t>
-            </a:r>
-            <a:endParaRPr lang="en-US" sz="2400" dirty="0"/>
+            <a:pPr algn="ctr"/>
+            <a:r>
+              <a:rPr lang="en-US" b="1" dirty="0" smtClean="0">
+                <a:solidFill>
+                  <a:schemeClr val="bg1"/>
+                </a:solidFill>
+              </a:rPr>
+              <a:t>Analysis with Scripts</a:t>
+            </a:r>
+            <a:endParaRPr lang="en-US" b="1" dirty="0">
+              <a:solidFill>
+                <a:schemeClr val="bg1"/>
+              </a:solidFill>
+            </a:endParaRPr>
+          </a:p>
+        </p:txBody>
+      </p:sp>
+      <p:sp>
+        <p:nvSpPr>
+          <p:cNvPr id="95" name="Rounded Rectangle 94"/>
+          <p:cNvSpPr/>
+          <p:nvPr/>
+        </p:nvSpPr>
+        <p:spPr>
+          <a:xfrm>
+            <a:off x="5173085" y="1077685"/>
+            <a:ext cx="2446915" cy="446315"/>
+          </a:xfrm>
+          <a:prstGeom prst="roundRect">
+            <a:avLst/>
+          </a:prstGeom>
+          <a:solidFill>
+            <a:schemeClr val="tx2"/>
+          </a:solidFill>
+        </p:spPr>
+        <p:style>
+          <a:lnRef idx="2">
+            <a:schemeClr val="accent1">
+              <a:shade val="50000"/>
+            </a:schemeClr>
+          </a:lnRef>
+          <a:fillRef idx="1">
+            <a:schemeClr val="accent1"/>
+          </a:fillRef>
+          <a:effectRef idx="0">
+            <a:schemeClr val="accent1"/>
+          </a:effectRef>
+          <a:fontRef idx="minor">
+            <a:schemeClr val="lt1"/>
+          </a:fontRef>
+        </p:style>
+        <p:txBody>
+          <a:bodyPr rtlCol="0" anchor="ctr"/>
+          <a:lstStyle/>
+          <a:p>
+            <a:pPr algn="ctr"/>
+            <a:r>
+              <a:rPr lang="en-US" b="1" dirty="0" smtClean="0">
+                <a:solidFill>
+                  <a:schemeClr val="bg1"/>
+                </a:solidFill>
+              </a:rPr>
+              <a:t>Analysis with </a:t>
+            </a:r>
+            <a:r>
+              <a:rPr lang="en-US" b="1" dirty="0" err="1" smtClean="0">
+                <a:solidFill>
+                  <a:schemeClr val="bg1"/>
+                </a:solidFill>
+              </a:rPr>
+              <a:t>Perftrack</a:t>
+            </a:r>
+            <a:endParaRPr lang="en-US" b="1" dirty="0">
+              <a:solidFill>
+                <a:schemeClr val="bg1"/>
+              </a:solidFill>
+            </a:endParaRPr>
           </a:p>
         </p:txBody>
       </p:sp>
     </p:spTree>
     <p:extLst>
       <p:ext uri="{BB962C8B-B14F-4D97-AF65-F5344CB8AC3E}">
-        <p14:creationId xmlns:p14="http://schemas.microsoft.com/office/powerpoint/2010/main" val="3530038075"/>
+        <p14:creationId xmlns:p14="http://schemas.microsoft.com/office/powerpoint/2010/main" val="642266325"/>
       </p:ext>
     </p:extLst>
   </p:cSld>
   <p:clrMapOvr>
     <a:masterClrMapping/>
   </p:clrMapOvr>
+  <p:timing>
+    <p:tnLst>
+      <p:par>
+        <p:cTn id="1" dur="indefinite" restart="never" nodeType="tmRoot"/>
+      </p:par>
+    </p:tnLst>
+  </p:timing>
 </p:sld>
 </file>
 
@@ -3863,37 +6364,43 @@
         </p:nvSpPr>
         <p:spPr/>
         <p:txBody>
-          <a:bodyPr/>
-          <a:lstStyle/>
-          <a:p>
-            <a:r>
-              <a:rPr lang="en-US" dirty="0" smtClean="0"/>
-              <a:t>Analysis with Scripts (cont.)</a:t>
-            </a:r>
-            <a:endParaRPr lang="en-US" dirty="0"/>
-          </a:p>
-        </p:txBody>
-      </p:sp>
-      <p:sp>
-        <p:nvSpPr>
-          <p:cNvPr id="3" name="Content Placeholder 2"/>
-          <p:cNvSpPr>
-            <a:spLocks noGrp="1"/>
-          </p:cNvSpPr>
-          <p:nvPr>
-            <p:ph idx="1"/>
-          </p:nvPr>
-        </p:nvSpPr>
-        <p:spPr/>
-        <p:txBody>
           <a:bodyPr>
-            <a:normAutofit lnSpcReduction="10000"/>
+            <a:normAutofit fontScale="90000"/>
           </a:bodyPr>
           <a:lstStyle/>
           <a:p>
             <a:r>
+              <a:rPr lang="en-US" dirty="0" smtClean="0"/>
+              <a:t>Approach 1: Analysis </a:t>
+            </a:r>
+            <a:r>
+              <a:rPr lang="en-US" dirty="0" smtClean="0"/>
+              <a:t>with Scripts</a:t>
+            </a:r>
+            <a:endParaRPr lang="en-US" dirty="0"/>
+          </a:p>
+        </p:txBody>
+      </p:sp>
+      <p:sp>
+        <p:nvSpPr>
+          <p:cNvPr id="3" name="Content Placeholder 2"/>
+          <p:cNvSpPr>
+            <a:spLocks noGrp="1"/>
+          </p:cNvSpPr>
+          <p:nvPr>
+            <p:ph idx="1"/>
+          </p:nvPr>
+        </p:nvSpPr>
+        <p:spPr/>
+        <p:txBody>
+          <a:bodyPr>
+            <a:normAutofit/>
+          </a:bodyPr>
+          <a:lstStyle/>
+          <a:p>
+            <a:r>
               <a:rPr lang="en-US" sz="2400" dirty="0" smtClean="0"/>
-              <a:t>Cluster analysis based on output of metric calculations</a:t>
+              <a:t>A set of custom tools was written to work with sensor data provided in CSV format</a:t>
             </a:r>
           </a:p>
           <a:p>
@@ -3905,7 +6412,15 @@
           <a:p>
             <a:r>
               <a:rPr lang="en-US" sz="2400" dirty="0" smtClean="0"/>
-              <a:t>Our work uses ELKI, an open source data mining tool with many customizable options (such as choice of clustering algorithms)</a:t>
+              <a:t>Mostly Haskell with calls to </a:t>
+            </a:r>
+            <a:r>
+              <a:rPr lang="en-US" sz="2400" dirty="0" err="1" smtClean="0"/>
+              <a:t>Gnuplot</a:t>
+            </a:r>
+            <a:r>
+              <a:rPr lang="en-US" sz="2400" dirty="0" smtClean="0"/>
+              <a:t> (earlier prototypes also used C, Perl and shell)</a:t>
             </a:r>
           </a:p>
           <a:p>
@@ -3917,7 +6432,7 @@
           <a:p>
             <a:r>
               <a:rPr lang="en-US" sz="2400" dirty="0" smtClean="0"/>
-              <a:t>We tried clustering on various metrics, including chiller water temperature deltas, coefficient of performance (COP) and cooling load</a:t>
+              <a:t>Generates a complete report including tables and graphs</a:t>
             </a:r>
           </a:p>
           <a:p>
@@ -3929,15 +6444,16 @@
           <a:p>
             <a:r>
               <a:rPr lang="en-US" sz="2400" dirty="0" smtClean="0"/>
-              <a:t>We developed a method to overlay cluster information over previously generated graphs</a:t>
-            </a:r>
+              <a:t>Calculates and graphs metrics such as temperature deltas, COP (coefficient of performance) and power usage</a:t>
+            </a:r>
+            <a:endParaRPr lang="en-US" sz="2400" dirty="0"/>
           </a:p>
         </p:txBody>
       </p:sp>
     </p:spTree>
     <p:extLst>
       <p:ext uri="{BB962C8B-B14F-4D97-AF65-F5344CB8AC3E}">
-        <p14:creationId xmlns:p14="http://schemas.microsoft.com/office/powerpoint/2010/main" val="562135246"/>
+        <p14:creationId xmlns:p14="http://schemas.microsoft.com/office/powerpoint/2010/main" val="3530038075"/>
       </p:ext>
     </p:extLst>
   </p:cSld>
@@ -3976,6 +6492,119 @@
         </p:nvSpPr>
         <p:spPr/>
         <p:txBody>
+          <a:bodyPr/>
+          <a:lstStyle/>
+          <a:p>
+            <a:r>
+              <a:rPr lang="en-US" dirty="0" smtClean="0"/>
+              <a:t>Analysis with Scripts (cont.)</a:t>
+            </a:r>
+            <a:endParaRPr lang="en-US" dirty="0"/>
+          </a:p>
+        </p:txBody>
+      </p:sp>
+      <p:sp>
+        <p:nvSpPr>
+          <p:cNvPr id="3" name="Content Placeholder 2"/>
+          <p:cNvSpPr>
+            <a:spLocks noGrp="1"/>
+          </p:cNvSpPr>
+          <p:nvPr>
+            <p:ph idx="1"/>
+          </p:nvPr>
+        </p:nvSpPr>
+        <p:spPr/>
+        <p:txBody>
+          <a:bodyPr>
+            <a:normAutofit lnSpcReduction="10000"/>
+          </a:bodyPr>
+          <a:lstStyle/>
+          <a:p>
+            <a:r>
+              <a:rPr lang="en-US" sz="2400" dirty="0" smtClean="0"/>
+              <a:t>Cluster analysis based on output of metric calculations</a:t>
+            </a:r>
+          </a:p>
+          <a:p>
+            <a:pPr marL="114300" indent="0">
+              <a:buNone/>
+            </a:pPr>
+            <a:endParaRPr lang="en-US" sz="2400" dirty="0" smtClean="0"/>
+          </a:p>
+          <a:p>
+            <a:r>
+              <a:rPr lang="en-US" sz="2400" dirty="0" smtClean="0"/>
+              <a:t>Our work uses ELKI, an open source data mining tool with many customizable options (such as choice of clustering algorithms)</a:t>
+            </a:r>
+          </a:p>
+          <a:p>
+            <a:pPr marL="114300" indent="0">
+              <a:buNone/>
+            </a:pPr>
+            <a:endParaRPr lang="en-US" sz="2400" dirty="0" smtClean="0"/>
+          </a:p>
+          <a:p>
+            <a:r>
+              <a:rPr lang="en-US" sz="2400" dirty="0" smtClean="0"/>
+              <a:t>We tried clustering on various metrics, including chiller water temperature deltas, coefficient of performance (COP) and cooling load</a:t>
+            </a:r>
+          </a:p>
+          <a:p>
+            <a:pPr marL="114300" indent="0">
+              <a:buNone/>
+            </a:pPr>
+            <a:endParaRPr lang="en-US" sz="2400" dirty="0" smtClean="0"/>
+          </a:p>
+          <a:p>
+            <a:r>
+              <a:rPr lang="en-US" sz="2400" dirty="0" smtClean="0"/>
+              <a:t>We developed a method to overlay cluster information over previously generated graphs</a:t>
+            </a:r>
+          </a:p>
+        </p:txBody>
+      </p:sp>
+    </p:spTree>
+    <p:extLst>
+      <p:ext uri="{BB962C8B-B14F-4D97-AF65-F5344CB8AC3E}">
+        <p14:creationId xmlns:p14="http://schemas.microsoft.com/office/powerpoint/2010/main" val="562135246"/>
+      </p:ext>
+    </p:extLst>
+  </p:cSld>
+  <p:clrMapOvr>
+    <a:masterClrMapping/>
+  </p:clrMapOvr>
+</p:sld>
+</file>
+
+<file path=ppt/slides/slide7.xml><?xml version="1.0" encoding="utf-8"?>
+<p:sld xmlns:a="http://schemas.openxmlformats.org/drawingml/2006/main" xmlns:r="http://schemas.openxmlformats.org/officeDocument/2006/relationships" xmlns:p="http://schemas.openxmlformats.org/presentationml/2006/main">
+  <p:cSld>
+    <p:spTree>
+      <p:nvGrpSpPr>
+        <p:cNvPr id="1" name=""/>
+        <p:cNvGrpSpPr/>
+        <p:nvPr/>
+      </p:nvGrpSpPr>
+      <p:grpSpPr>
+        <a:xfrm>
+          <a:off x="0" y="0"/>
+          <a:ext cx="0" cy="0"/>
+          <a:chOff x="0" y="0"/>
+          <a:chExt cx="0" cy="0"/>
+        </a:xfrm>
+      </p:grpSpPr>
+      <p:sp>
+        <p:nvSpPr>
+          <p:cNvPr id="2" name="Title 1"/>
+          <p:cNvSpPr>
+            <a:spLocks noGrp="1"/>
+          </p:cNvSpPr>
+          <p:nvPr>
+            <p:ph type="title"/>
+          </p:nvPr>
+        </p:nvSpPr>
+        <p:spPr/>
+        <p:txBody>
           <a:bodyPr>
             <a:normAutofit/>
           </a:bodyPr>
@@ -3983,7 +6612,11 @@
           <a:p>
             <a:r>
               <a:rPr lang="en-US" dirty="0" smtClean="0"/>
-              <a:t>Time-correlated cluster charts</a:t>
+              <a:t>Time-correlated </a:t>
+            </a:r>
+            <a:r>
+              <a:rPr lang="en-US" dirty="0" smtClean="0"/>
+              <a:t>Cluster Charts</a:t>
             </a:r>
             <a:endParaRPr lang="en-US" dirty="0"/>
           </a:p>
@@ -4113,7 +6746,7 @@
 </p:sld>
 </file>
 
-<file path=ppt/slides/slide7.xml><?xml version="1.0" encoding="utf-8"?>
+<file path=ppt/slides/slide8.xml><?xml version="1.0" encoding="utf-8"?>
 <p:sld xmlns:a="http://schemas.openxmlformats.org/drawingml/2006/main" xmlns:r="http://schemas.openxmlformats.org/officeDocument/2006/relationships" xmlns:p="http://schemas.openxmlformats.org/presentationml/2006/main">
   <p:cSld>
     <p:spTree>
@@ -4149,7 +6782,15 @@
           <a:p>
             <a:r>
               <a:rPr lang="en-US" sz="3600" dirty="0" smtClean="0"/>
-              <a:t>Chiller Power (KW) chart, HD</a:t>
+              <a:t>Chiller Power (KW) </a:t>
+            </a:r>
+            <a:r>
+              <a:rPr lang="en-US" sz="3600" dirty="0" smtClean="0"/>
+              <a:t>Chart</a:t>
+            </a:r>
+            <a:r>
+              <a:rPr lang="en-US" sz="3600" dirty="0" smtClean="0"/>
+              <a:t>, HD</a:t>
             </a:r>
             <a:r>
               <a:rPr lang="en-US" sz="3600" dirty="0"/>
@@ -4157,7 +6798,7 @@
             </a:r>
             <a:r>
               <a:rPr lang="en-US" sz="3600" dirty="0" smtClean="0"/>
-              <a:t>data</a:t>
+              <a:t>Data</a:t>
             </a:r>
             <a:endParaRPr lang="en-US" sz="3600" dirty="0"/>
           </a:p>
@@ -4217,7 +6858,7 @@
 </p:sld>
 </file>
 
-<file path=ppt/slides/slide8.xml><?xml version="1.0" encoding="utf-8"?>
+<file path=ppt/slides/slide9.xml><?xml version="1.0" encoding="utf-8"?>
 <p:sld xmlns:a="http://schemas.openxmlformats.org/drawingml/2006/main" xmlns:r="http://schemas.openxmlformats.org/officeDocument/2006/relationships" xmlns:p="http://schemas.openxmlformats.org/presentationml/2006/main">
   <p:cSld>
     <p:spTree>
@@ -4247,13 +6888,17 @@
         <p:spPr/>
         <p:txBody>
           <a:bodyPr>
-            <a:normAutofit/>
+            <a:normAutofit fontScale="90000"/>
           </a:bodyPr>
           <a:lstStyle/>
           <a:p>
             <a:r>
               <a:rPr lang="en-US" sz="3600" dirty="0" smtClean="0"/>
-              <a:t>Associated time-correlated cluster chart</a:t>
+              <a:t>Associated </a:t>
+            </a:r>
+            <a:r>
+              <a:rPr lang="en-US" sz="3600" dirty="0" smtClean="0"/>
+              <a:t>Time-correlated Cluster Chart</a:t>
             </a:r>
             <a:endParaRPr lang="en-US" sz="3600" dirty="0"/>
           </a:p>
@@ -4304,78 +6949,6 @@
     <p:extLst>
       <p:ext uri="{BB962C8B-B14F-4D97-AF65-F5344CB8AC3E}">
         <p14:creationId xmlns:p14="http://schemas.microsoft.com/office/powerpoint/2010/main" val="372700306"/>
-      </p:ext>
-    </p:extLst>
-  </p:cSld>
-  <p:clrMapOvr>
-    <a:masterClrMapping/>
-  </p:clrMapOvr>
-</p:sld>
-</file>
-
-<file path=ppt/slides/slide9.xml><?xml version="1.0" encoding="utf-8"?>
-<p:sld xmlns:a="http://schemas.openxmlformats.org/drawingml/2006/main" xmlns:r="http://schemas.openxmlformats.org/officeDocument/2006/relationships" xmlns:p="http://schemas.openxmlformats.org/presentationml/2006/main">
-  <p:cSld>
-    <p:spTree>
-      <p:nvGrpSpPr>
-        <p:cNvPr id="1" name=""/>
-        <p:cNvGrpSpPr/>
-        <p:nvPr/>
-      </p:nvGrpSpPr>
-      <p:grpSpPr>
-        <a:xfrm>
-          <a:off x="0" y="0"/>
-          <a:ext cx="0" cy="0"/>
-          <a:chOff x="0" y="0"/>
-          <a:chExt cx="0" cy="0"/>
-        </a:xfrm>
-      </p:grpSpPr>
-      <p:sp>
-        <p:nvSpPr>
-          <p:cNvPr id="2" name="Title 1"/>
-          <p:cNvSpPr>
-            <a:spLocks noGrp="1"/>
-          </p:cNvSpPr>
-          <p:nvPr>
-            <p:ph type="title"/>
-          </p:nvPr>
-        </p:nvSpPr>
-        <p:spPr/>
-        <p:txBody>
-          <a:bodyPr/>
-          <a:lstStyle/>
-          <a:p>
-            <a:r>
-              <a:rPr lang="en-US" sz="4000" dirty="0" smtClean="0"/>
-              <a:t>Approach 2: Perftrack Modifications</a:t>
-            </a:r>
-            <a:endParaRPr lang="en-US" sz="4000" dirty="0"/>
-          </a:p>
-        </p:txBody>
-      </p:sp>
-      <p:sp>
-        <p:nvSpPr>
-          <p:cNvPr id="3" name="Content Placeholder 2"/>
-          <p:cNvSpPr>
-            <a:spLocks noGrp="1"/>
-          </p:cNvSpPr>
-          <p:nvPr>
-            <p:ph idx="1"/>
-          </p:nvPr>
-        </p:nvSpPr>
-        <p:spPr/>
-        <p:txBody>
-          <a:bodyPr/>
-          <a:lstStyle/>
-          <a:p>
-            <a:endParaRPr lang="en-US"/>
-          </a:p>
-        </p:txBody>
-      </p:sp>
-    </p:spTree>
-    <p:extLst>
-      <p:ext uri="{BB962C8B-B14F-4D97-AF65-F5344CB8AC3E}">
-        <p14:creationId xmlns:p14="http://schemas.microsoft.com/office/powerpoint/2010/main" val="3126784475"/>
       </p:ext>
     </p:extLst>
   </p:cSld>

</xml_diff>

<commit_message>
Updated slide PDF and slightly resized a single graphic.
</commit_message>
<xml_diff>
--- a/paper/Integrated Data Center Power and Cooling Analysis.pptx
+++ b/paper/Integrated Data Center Power and Cooling Analysis.pptx
@@ -3688,15 +3688,7 @@
             <a:pPr lvl="1"/>
             <a:r>
               <a:rPr lang="en-US" dirty="0" smtClean="0"/>
-              <a:t>Full </a:t>
-            </a:r>
-            <a:r>
-              <a:rPr lang="en-US" dirty="0" smtClean="0"/>
-              <a:t>integration of script </a:t>
-            </a:r>
-            <a:r>
-              <a:rPr lang="en-US" dirty="0" smtClean="0"/>
-              <a:t>work</a:t>
+              <a:t>Full integration of script work</a:t>
             </a:r>
           </a:p>
           <a:p>
@@ -3729,13 +3721,8 @@
             <a:pPr lvl="1"/>
             <a:r>
               <a:rPr lang="en-US" dirty="0" smtClean="0"/>
-              <a:t>Graphica</a:t>
-            </a:r>
-            <a:r>
-              <a:rPr lang="en-US" dirty="0" smtClean="0"/>
-              <a:t>l user interface enhancement</a:t>
-            </a:r>
-            <a:endParaRPr lang="en-US" dirty="0" smtClean="0"/>
+              <a:t>Graphical user interface enhancement</a:t>
+            </a:r>
           </a:p>
           <a:p>
             <a:endParaRPr lang="en-US" dirty="0" smtClean="0"/>
@@ -3804,11 +3791,7 @@
           <a:p>
             <a:r>
               <a:rPr lang="en-US" dirty="0" smtClean="0"/>
-              <a:t>About the </a:t>
-            </a:r>
-            <a:r>
-              <a:rPr lang="en-US" dirty="0" smtClean="0"/>
-              <a:t>Project</a:t>
+              <a:t>About the Project</a:t>
             </a:r>
             <a:endParaRPr lang="en-US" dirty="0"/>
           </a:p>
@@ -3922,11 +3905,7 @@
           <a:p>
             <a:r>
               <a:rPr lang="en-US" dirty="0" smtClean="0"/>
-              <a:t>About the </a:t>
-            </a:r>
-            <a:r>
-              <a:rPr lang="en-US" dirty="0" smtClean="0"/>
-              <a:t>Data</a:t>
+              <a:t>About the Data</a:t>
             </a:r>
             <a:endParaRPr lang="en-US" dirty="0"/>
           </a:p>
@@ -4031,8 +4010,8 @@
         </p:nvSpPr>
         <p:spPr>
           <a:xfrm>
-            <a:off x="544727" y="1371600"/>
-            <a:ext cx="3733800" cy="5410202"/>
+            <a:off x="280978" y="1377042"/>
+            <a:ext cx="3523444" cy="5105400"/>
           </a:xfrm>
           <a:prstGeom prst="roundRect">
             <a:avLst/>
@@ -4105,8 +4084,8 @@
         </p:nvGrpSpPr>
         <p:grpSpPr>
           <a:xfrm>
-            <a:off x="914400" y="1828800"/>
-            <a:ext cx="3059328" cy="4343882"/>
+            <a:off x="650651" y="1834242"/>
+            <a:ext cx="2871157" cy="4076702"/>
             <a:chOff x="914400" y="1676400"/>
             <a:chExt cx="3059328" cy="4343882"/>
           </a:xfrm>
@@ -4844,15 +4823,7 @@
                     <a:lumMod val="75000"/>
                   </a:schemeClr>
                 </a:solidFill>
-                <a:extLst>
-                  <a:ext uri="{909E8E84-426E-40DD-AFC4-6F175D3DCCD1}">
-                    <a14:hiddenFill xmlns:a14="http://schemas.microsoft.com/office/drawing/2010/main">
-                      <a:solidFill>
-                        <a:srgbClr val="FFFFFF"/>
-                      </a:solidFill>
-                    </a14:hiddenFill>
-                  </a:ext>
-                </a:extLst>
+                <a:extLst/>
               </p:spPr>
             </p:pic>
             <p:pic>
@@ -4889,15 +4860,7 @@
                     <a:lumMod val="75000"/>
                   </a:schemeClr>
                 </a:solidFill>
-                <a:extLst>
-                  <a:ext uri="{909E8E84-426E-40DD-AFC4-6F175D3DCCD1}">
-                    <a14:hiddenFill xmlns:a14="http://schemas.microsoft.com/office/drawing/2010/main">
-                      <a:solidFill>
-                        <a:srgbClr val="FFFFFF"/>
-                      </a:solidFill>
-                    </a14:hiddenFill>
-                  </a:ext>
-                </a:extLst>
+                <a:extLst/>
               </p:spPr>
             </p:pic>
             <p:pic>
@@ -4934,15 +4897,7 @@
                     <a:lumMod val="75000"/>
                   </a:schemeClr>
                 </a:solidFill>
-                <a:extLst>
-                  <a:ext uri="{909E8E84-426E-40DD-AFC4-6F175D3DCCD1}">
-                    <a14:hiddenFill xmlns:a14="http://schemas.microsoft.com/office/drawing/2010/main">
-                      <a:solidFill>
-                        <a:srgbClr val="FFFFFF"/>
-                      </a:solidFill>
-                    </a14:hiddenFill>
-                  </a:ext>
-                </a:extLst>
+                <a:extLst/>
               </p:spPr>
             </p:pic>
           </p:grpSp>
@@ -4956,8 +4911,8 @@
         </p:nvGrpSpPr>
         <p:grpSpPr>
           <a:xfrm>
-            <a:off x="4572000" y="1295400"/>
-            <a:ext cx="3733800" cy="5486402"/>
+            <a:off x="4356100" y="1300842"/>
+            <a:ext cx="3526365" cy="5181600"/>
             <a:chOff x="4787196" y="1142998"/>
             <a:chExt cx="3733800" cy="5486402"/>
           </a:xfrm>
@@ -6205,7 +6160,7 @@
         </p:nvSpPr>
         <p:spPr>
           <a:xfrm>
-            <a:off x="1371600" y="1153885"/>
+            <a:off x="963782" y="1077684"/>
             <a:ext cx="2209800" cy="446315"/>
           </a:xfrm>
           <a:prstGeom prst="roundRect">
@@ -6260,7 +6215,7 @@
         </p:nvSpPr>
         <p:spPr>
           <a:xfrm>
-            <a:off x="5173085" y="1077685"/>
+            <a:off x="4957185" y="1083127"/>
             <a:ext cx="2446915" cy="446315"/>
           </a:xfrm>
           <a:prstGeom prst="roundRect">
@@ -6371,11 +6326,7 @@
           <a:p>
             <a:r>
               <a:rPr lang="en-US" dirty="0" smtClean="0"/>
-              <a:t>Approach 1: Analysis </a:t>
-            </a:r>
-            <a:r>
-              <a:rPr lang="en-US" dirty="0" smtClean="0"/>
-              <a:t>with Scripts</a:t>
+              <a:t>Approach 1: Analysis with Scripts</a:t>
             </a:r>
             <a:endParaRPr lang="en-US" dirty="0"/>
           </a:p>
@@ -6612,11 +6563,7 @@
           <a:p>
             <a:r>
               <a:rPr lang="en-US" dirty="0" smtClean="0"/>
-              <a:t>Time-correlated </a:t>
-            </a:r>
-            <a:r>
-              <a:rPr lang="en-US" dirty="0" smtClean="0"/>
-              <a:t>Cluster Charts</a:t>
+              <a:t>Time-correlated Cluster Charts</a:t>
             </a:r>
             <a:endParaRPr lang="en-US" dirty="0"/>
           </a:p>
@@ -6782,15 +6729,7 @@
           <a:p>
             <a:r>
               <a:rPr lang="en-US" sz="3600" dirty="0" smtClean="0"/>
-              <a:t>Chiller Power (KW) </a:t>
-            </a:r>
-            <a:r>
-              <a:rPr lang="en-US" sz="3600" dirty="0" smtClean="0"/>
-              <a:t>Chart</a:t>
-            </a:r>
-            <a:r>
-              <a:rPr lang="en-US" sz="3600" dirty="0" smtClean="0"/>
-              <a:t>, HD</a:t>
+              <a:t>Chiller Power (KW) Chart, HD</a:t>
             </a:r>
             <a:r>
               <a:rPr lang="en-US" sz="3600" dirty="0"/>
@@ -6894,11 +6833,7 @@
           <a:p>
             <a:r>
               <a:rPr lang="en-US" sz="3600" dirty="0" smtClean="0"/>
-              <a:t>Associated </a:t>
-            </a:r>
-            <a:r>
-              <a:rPr lang="en-US" sz="3600" dirty="0" smtClean="0"/>
-              <a:t>Time-correlated Cluster Chart</a:t>
+              <a:t>Associated Time-correlated Cluster Chart</a:t>
             </a:r>
             <a:endParaRPr lang="en-US" sz="3600" dirty="0"/>
           </a:p>

</xml_diff>

<commit_message>
Added the perftrack GUI screenshot showing 'Cluster Data' option.
</commit_message>
<xml_diff>
--- a/paper/Integrated Data Center Power and Cooling Analysis.pptx
+++ b/paper/Integrated Data Center Power and Cooling Analysis.pptx
@@ -3500,9 +3500,16 @@
             <p:ph idx="1"/>
           </p:nvPr>
         </p:nvSpPr>
-        <p:spPr/>
-        <p:txBody>
-          <a:bodyPr/>
+        <p:spPr>
+          <a:xfrm>
+            <a:off x="457200" y="1600200"/>
+            <a:ext cx="5257800" cy="4800600"/>
+          </a:xfrm>
+        </p:spPr>
+        <p:txBody>
+          <a:bodyPr>
+            <a:normAutofit/>
+          </a:bodyPr>
           <a:lstStyle/>
           <a:p>
             <a:r>
@@ -3515,12 +3522,13 @@
             </a:r>
           </a:p>
           <a:p>
-            <a:endParaRPr lang="en-US" sz="2400" dirty="0"/>
-          </a:p>
-          <a:p>
+            <a:r>
+              <a:rPr lang="en-US" sz="2400" dirty="0" smtClean="0"/>
+              <a:t>New </a:t>
+            </a:r>
             <a:r>
               <a:rPr lang="en-US" sz="2400" dirty="0"/>
-              <a:t>New menu item ‘Cluster Data’ is added to </a:t>
+              <a:t>menu item ‘Cluster Data’ is added to </a:t>
             </a:r>
             <a:r>
               <a:rPr lang="en-US" sz="2400" dirty="0" err="1"/>
@@ -3529,9 +3537,6 @@
             <a:endParaRPr lang="en-US" sz="2400" dirty="0"/>
           </a:p>
           <a:p>
-            <a:endParaRPr lang="en-US" sz="2400" dirty="0" smtClean="0"/>
-          </a:p>
-          <a:p>
             <a:r>
               <a:rPr lang="en-US" sz="2400" dirty="0" err="1" smtClean="0"/>
               <a:t>Perftrack</a:t>
@@ -3546,9 +3551,6 @@
             </a:r>
           </a:p>
           <a:p>
-            <a:endParaRPr lang="en-US" sz="2400" dirty="0" smtClean="0"/>
-          </a:p>
-          <a:p>
             <a:r>
               <a:rPr lang="en-US" sz="2400" dirty="0" smtClean="0"/>
               <a:t>K-Means </a:t>
@@ -3567,9 +3569,6 @@
             </a:r>
           </a:p>
           <a:p>
-            <a:endParaRPr lang="en-US" sz="2400" dirty="0" smtClean="0"/>
-          </a:p>
-          <a:p>
             <a:r>
               <a:rPr lang="en-US" sz="2400" dirty="0" err="1" smtClean="0"/>
               <a:t>Perftrack</a:t>
@@ -3586,6 +3585,36 @@
           </a:p>
         </p:txBody>
       </p:sp>
+      <p:pic>
+        <p:nvPicPr>
+          <p:cNvPr id="4" name="Picture 3"/>
+          <p:cNvPicPr>
+            <a:picLocks noChangeAspect="1"/>
+          </p:cNvPicPr>
+          <p:nvPr/>
+        </p:nvPicPr>
+        <p:blipFill>
+          <a:blip r:embed="rId2">
+            <a:extLst>
+              <a:ext uri="{28A0092B-C50C-407E-A947-70E740481C1C}">
+                <a14:useLocalDpi xmlns:a14="http://schemas.microsoft.com/office/drawing/2010/main" val="0"/>
+              </a:ext>
+            </a:extLst>
+          </a:blip>
+          <a:stretch>
+            <a:fillRect/>
+          </a:stretch>
+        </p:blipFill>
+        <p:spPr>
+          <a:xfrm>
+            <a:off x="5800595" y="1600200"/>
+            <a:ext cx="2391109" cy="1438476"/>
+          </a:xfrm>
+          <a:prstGeom prst="rect">
+            <a:avLst/>
+          </a:prstGeom>
+        </p:spPr>
+      </p:pic>
     </p:spTree>
     <p:extLst>
       <p:ext uri="{BB962C8B-B14F-4D97-AF65-F5344CB8AC3E}">

</xml_diff>